<commit_message>
Added seacr streamer and deactivated account in framework
</commit_message>
<xml_diff>
--- a/StreamZ_presentation (part 2).pptx
+++ b/StreamZ_presentation (part 2).pptx
@@ -281,7 +281,7 @@
           <a:p>
             <a:fld id="{A19A71F5-DA94-4BA2-B9E9-1E6B8C3AD471}" type="datetimeFigureOut">
               <a:rPr lang="pt-PT" smtClean="0"/>
-              <a:t>30/12/2020</a:t>
+              <a:t>02/01/2021</a:t>
             </a:fld>
             <a:endParaRPr lang="pt-PT"/>
           </a:p>
@@ -479,7 +479,7 @@
           <a:p>
             <a:fld id="{A19A71F5-DA94-4BA2-B9E9-1E6B8C3AD471}" type="datetimeFigureOut">
               <a:rPr lang="pt-PT" smtClean="0"/>
-              <a:t>30/12/2020</a:t>
+              <a:t>02/01/2021</a:t>
             </a:fld>
             <a:endParaRPr lang="pt-PT"/>
           </a:p>
@@ -687,7 +687,7 @@
           <a:p>
             <a:fld id="{A19A71F5-DA94-4BA2-B9E9-1E6B8C3AD471}" type="datetimeFigureOut">
               <a:rPr lang="pt-PT" smtClean="0"/>
-              <a:t>30/12/2020</a:t>
+              <a:t>02/01/2021</a:t>
             </a:fld>
             <a:endParaRPr lang="pt-PT"/>
           </a:p>
@@ -885,7 +885,7 @@
           <a:p>
             <a:fld id="{A19A71F5-DA94-4BA2-B9E9-1E6B8C3AD471}" type="datetimeFigureOut">
               <a:rPr lang="pt-PT" smtClean="0"/>
-              <a:t>30/12/2020</a:t>
+              <a:t>02/01/2021</a:t>
             </a:fld>
             <a:endParaRPr lang="pt-PT"/>
           </a:p>
@@ -1160,7 +1160,7 @@
           <a:p>
             <a:fld id="{A19A71F5-DA94-4BA2-B9E9-1E6B8C3AD471}" type="datetimeFigureOut">
               <a:rPr lang="pt-PT" smtClean="0"/>
-              <a:t>30/12/2020</a:t>
+              <a:t>02/01/2021</a:t>
             </a:fld>
             <a:endParaRPr lang="pt-PT"/>
           </a:p>
@@ -1425,7 +1425,7 @@
           <a:p>
             <a:fld id="{A19A71F5-DA94-4BA2-B9E9-1E6B8C3AD471}" type="datetimeFigureOut">
               <a:rPr lang="pt-PT" smtClean="0"/>
-              <a:t>30/12/2020</a:t>
+              <a:t>02/01/2021</a:t>
             </a:fld>
             <a:endParaRPr lang="pt-PT"/>
           </a:p>
@@ -1837,7 +1837,7 @@
           <a:p>
             <a:fld id="{A19A71F5-DA94-4BA2-B9E9-1E6B8C3AD471}" type="datetimeFigureOut">
               <a:rPr lang="pt-PT" smtClean="0"/>
-              <a:t>30/12/2020</a:t>
+              <a:t>02/01/2021</a:t>
             </a:fld>
             <a:endParaRPr lang="pt-PT"/>
           </a:p>
@@ -1978,7 +1978,7 @@
           <a:p>
             <a:fld id="{A19A71F5-DA94-4BA2-B9E9-1E6B8C3AD471}" type="datetimeFigureOut">
               <a:rPr lang="pt-PT" smtClean="0"/>
-              <a:t>30/12/2020</a:t>
+              <a:t>02/01/2021</a:t>
             </a:fld>
             <a:endParaRPr lang="pt-PT"/>
           </a:p>
@@ -2091,7 +2091,7 @@
           <a:p>
             <a:fld id="{A19A71F5-DA94-4BA2-B9E9-1E6B8C3AD471}" type="datetimeFigureOut">
               <a:rPr lang="pt-PT" smtClean="0"/>
-              <a:t>30/12/2020</a:t>
+              <a:t>02/01/2021</a:t>
             </a:fld>
             <a:endParaRPr lang="pt-PT"/>
           </a:p>
@@ -2402,7 +2402,7 @@
           <a:p>
             <a:fld id="{A19A71F5-DA94-4BA2-B9E9-1E6B8C3AD471}" type="datetimeFigureOut">
               <a:rPr lang="pt-PT" smtClean="0"/>
-              <a:t>30/12/2020</a:t>
+              <a:t>02/01/2021</a:t>
             </a:fld>
             <a:endParaRPr lang="pt-PT"/>
           </a:p>
@@ -2690,7 +2690,7 @@
           <a:p>
             <a:fld id="{A19A71F5-DA94-4BA2-B9E9-1E6B8C3AD471}" type="datetimeFigureOut">
               <a:rPr lang="pt-PT" smtClean="0"/>
-              <a:t>30/12/2020</a:t>
+              <a:t>02/01/2021</a:t>
             </a:fld>
             <a:endParaRPr lang="pt-PT"/>
           </a:p>
@@ -2931,7 +2931,7 @@
           <a:p>
             <a:fld id="{A19A71F5-DA94-4BA2-B9E9-1E6B8C3AD471}" type="datetimeFigureOut">
               <a:rPr lang="pt-PT" smtClean="0"/>
-              <a:t>30/12/2020</a:t>
+              <a:t>02/01/2021</a:t>
             </a:fld>
             <a:endParaRPr lang="pt-PT"/>
           </a:p>
@@ -4518,6 +4518,76 @@
           <a:chExt cx="0" cy="0"/>
         </a:xfrm>
       </p:grpSpPr>
+      <p:pic>
+        <p:nvPicPr>
+          <p:cNvPr id="39" name="Imagem 38" descr="Uma imagem com texto&#10;&#10;Descrição gerada automaticamente">
+            <a:extLst>
+              <a:ext uri="{FF2B5EF4-FFF2-40B4-BE49-F238E27FC236}">
+                <a16:creationId xmlns:a16="http://schemas.microsoft.com/office/drawing/2014/main" id="{8A110F93-6A86-444C-A449-A5FA2C8DDCF9}"/>
+              </a:ext>
+            </a:extLst>
+          </p:cNvPr>
+          <p:cNvPicPr>
+            <a:picLocks noChangeAspect="1"/>
+          </p:cNvPicPr>
+          <p:nvPr/>
+        </p:nvPicPr>
+        <p:blipFill rotWithShape="1">
+          <a:blip r:embed="rId2">
+            <a:extLst>
+              <a:ext uri="{28A0092B-C50C-407E-A947-70E740481C1C}">
+                <a14:useLocalDpi xmlns:a14="http://schemas.microsoft.com/office/drawing/2010/main" val="0"/>
+              </a:ext>
+            </a:extLst>
+          </a:blip>
+          <a:srcRect r="4277" b="2621"/>
+          <a:stretch/>
+        </p:blipFill>
+        <p:spPr>
+          <a:xfrm>
+            <a:off x="7150915" y="3295303"/>
+            <a:ext cx="1889330" cy="2960930"/>
+          </a:xfrm>
+          <a:prstGeom prst="rect">
+            <a:avLst/>
+          </a:prstGeom>
+        </p:spPr>
+      </p:pic>
+      <p:pic>
+        <p:nvPicPr>
+          <p:cNvPr id="37" name="Imagem 36" descr="Uma imagem com texto&#10;&#10;Descrição gerada automaticamente">
+            <a:extLst>
+              <a:ext uri="{FF2B5EF4-FFF2-40B4-BE49-F238E27FC236}">
+                <a16:creationId xmlns:a16="http://schemas.microsoft.com/office/drawing/2014/main" id="{BE4B7270-B308-4400-9475-F0D34D95CBF5}"/>
+              </a:ext>
+            </a:extLst>
+          </p:cNvPr>
+          <p:cNvPicPr>
+            <a:picLocks noChangeAspect="1"/>
+          </p:cNvPicPr>
+          <p:nvPr/>
+        </p:nvPicPr>
+        <p:blipFill rotWithShape="1">
+          <a:blip r:embed="rId3">
+            <a:extLst>
+              <a:ext uri="{28A0092B-C50C-407E-A947-70E740481C1C}">
+                <a14:useLocalDpi xmlns:a14="http://schemas.microsoft.com/office/drawing/2010/main" val="0"/>
+              </a:ext>
+            </a:extLst>
+          </a:blip>
+          <a:srcRect l="3534" t="-369"/>
+          <a:stretch/>
+        </p:blipFill>
+        <p:spPr>
+          <a:xfrm>
+            <a:off x="2280237" y="3295303"/>
+            <a:ext cx="2109835" cy="2745903"/>
+          </a:xfrm>
+          <a:prstGeom prst="rect">
+            <a:avLst/>
+          </a:prstGeom>
+        </p:spPr>
+      </p:pic>
       <p:sp>
         <p:nvSpPr>
           <p:cNvPr id="27" name="Retângulo: Cantos Diagonais Cortados 26">
@@ -4616,114 +4686,6 @@
           </a:p>
         </p:txBody>
       </p:sp>
-      <p:pic>
-        <p:nvPicPr>
-          <p:cNvPr id="7" name="Imagem 6">
-            <a:extLst>
-              <a:ext uri="{FF2B5EF4-FFF2-40B4-BE49-F238E27FC236}">
-                <a16:creationId xmlns:a16="http://schemas.microsoft.com/office/drawing/2014/main" id="{2C9D3B97-E1A5-4559-A25D-229F2BC860CA}"/>
-              </a:ext>
-            </a:extLst>
-          </p:cNvPr>
-          <p:cNvPicPr>
-            <a:picLocks noChangeAspect="1"/>
-          </p:cNvPicPr>
-          <p:nvPr/>
-        </p:nvPicPr>
-        <p:blipFill>
-          <a:blip r:embed="rId2">
-            <a:extLst>
-              <a:ext uri="{28A0092B-C50C-407E-A947-70E740481C1C}">
-                <a14:useLocalDpi xmlns:a14="http://schemas.microsoft.com/office/drawing/2010/main" val="0"/>
-              </a:ext>
-            </a:extLst>
-          </a:blip>
-          <a:stretch>
-            <a:fillRect/>
-          </a:stretch>
-        </p:blipFill>
-        <p:spPr>
-          <a:xfrm>
-            <a:off x="5047612" y="1000017"/>
-            <a:ext cx="2096773" cy="2014868"/>
-          </a:xfrm>
-          <a:prstGeom prst="rect">
-            <a:avLst/>
-          </a:prstGeom>
-        </p:spPr>
-      </p:pic>
-      <p:pic>
-        <p:nvPicPr>
-          <p:cNvPr id="11" name="Imagem 10">
-            <a:extLst>
-              <a:ext uri="{FF2B5EF4-FFF2-40B4-BE49-F238E27FC236}">
-                <a16:creationId xmlns:a16="http://schemas.microsoft.com/office/drawing/2014/main" id="{80B4A62B-2658-4719-9DB8-803994DE2C03}"/>
-              </a:ext>
-            </a:extLst>
-          </p:cNvPr>
-          <p:cNvPicPr>
-            <a:picLocks noChangeAspect="1"/>
-          </p:cNvPicPr>
-          <p:nvPr/>
-        </p:nvPicPr>
-        <p:blipFill>
-          <a:blip r:embed="rId3">
-            <a:extLst>
-              <a:ext uri="{28A0092B-C50C-407E-A947-70E740481C1C}">
-                <a14:useLocalDpi xmlns:a14="http://schemas.microsoft.com/office/drawing/2010/main" val="0"/>
-              </a:ext>
-            </a:extLst>
-          </a:blip>
-          <a:stretch>
-            <a:fillRect/>
-          </a:stretch>
-        </p:blipFill>
-        <p:spPr>
-          <a:xfrm>
-            <a:off x="255297" y="4004973"/>
-            <a:ext cx="3952492" cy="2485149"/>
-          </a:xfrm>
-          <a:prstGeom prst="rect">
-            <a:avLst/>
-          </a:prstGeom>
-        </p:spPr>
-      </p:pic>
-      <p:pic>
-        <p:nvPicPr>
-          <p:cNvPr id="13" name="Imagem 12">
-            <a:extLst>
-              <a:ext uri="{FF2B5EF4-FFF2-40B4-BE49-F238E27FC236}">
-                <a16:creationId xmlns:a16="http://schemas.microsoft.com/office/drawing/2014/main" id="{1B51BDFD-49F4-4417-A089-BA2F5942C40E}"/>
-              </a:ext>
-            </a:extLst>
-          </p:cNvPr>
-          <p:cNvPicPr>
-            <a:picLocks noChangeAspect="1"/>
-          </p:cNvPicPr>
-          <p:nvPr/>
-        </p:nvPicPr>
-        <p:blipFill>
-          <a:blip r:embed="rId4">
-            <a:extLst>
-              <a:ext uri="{28A0092B-C50C-407E-A947-70E740481C1C}">
-                <a14:useLocalDpi xmlns:a14="http://schemas.microsoft.com/office/drawing/2010/main" val="0"/>
-              </a:ext>
-            </a:extLst>
-          </a:blip>
-          <a:stretch>
-            <a:fillRect/>
-          </a:stretch>
-        </p:blipFill>
-        <p:spPr>
-          <a:xfrm>
-            <a:off x="7984211" y="4004973"/>
-            <a:ext cx="3825933" cy="2476610"/>
-          </a:xfrm>
-          <a:prstGeom prst="rect">
-            <a:avLst/>
-          </a:prstGeom>
-        </p:spPr>
-      </p:pic>
       <p:cxnSp>
         <p:nvCxnSpPr>
           <p:cNvPr id="56" name="Conexão: Ângulo Reto 55">
@@ -4735,17 +4697,20 @@
           </p:cNvPr>
           <p:cNvCxnSpPr>
             <a:cxnSpLocks/>
-            <a:endCxn id="11" idx="0"/>
+            <a:stCxn id="3" idx="2"/>
+            <a:endCxn id="37" idx="0"/>
           </p:cNvCxnSpPr>
           <p:nvPr/>
         </p:nvCxnSpPr>
         <p:spPr>
-          <a:xfrm rot="10800000" flipV="1">
-            <a:off x="2231543" y="2775529"/>
-            <a:ext cx="3961474" cy="1229444"/>
+          <a:xfrm rot="5400000">
+            <a:off x="4233428" y="1432734"/>
+            <a:ext cx="964296" cy="2760842"/>
           </a:xfrm>
-          <a:prstGeom prst="bentConnector2">
-            <a:avLst/>
+          <a:prstGeom prst="bentConnector3">
+            <a:avLst>
+              <a:gd name="adj1" fmla="val 50000"/>
+            </a:avLst>
           </a:prstGeom>
           <a:ln w="38100">
             <a:tailEnd type="triangle"/>
@@ -4777,14 +4742,14 @@
           </p:cNvPr>
           <p:cNvCxnSpPr>
             <a:cxnSpLocks/>
-            <a:endCxn id="13" idx="0"/>
+            <a:endCxn id="39" idx="0"/>
           </p:cNvCxnSpPr>
           <p:nvPr/>
         </p:nvCxnSpPr>
         <p:spPr>
           <a:xfrm>
-            <a:off x="6674367" y="2772035"/>
-            <a:ext cx="3222811" cy="1232938"/>
+            <a:off x="6093439" y="2815617"/>
+            <a:ext cx="2002141" cy="479686"/>
           </a:xfrm>
           <a:prstGeom prst="bentConnector2">
             <a:avLst/>
@@ -4822,7 +4787,7 @@
         </p:nvGrpSpPr>
         <p:grpSpPr>
           <a:xfrm>
-            <a:off x="3988002" y="6304189"/>
+            <a:off x="4053528" y="5809972"/>
             <a:ext cx="413075" cy="371866"/>
             <a:chOff x="510203" y="599076"/>
             <a:chExt cx="413075" cy="371866"/>
@@ -4908,7 +4873,7 @@
                     <a:schemeClr val="bg1"/>
                   </a:solidFill>
                 </a:rPr>
-                <a:t>6</a:t>
+                <a:t>1</a:t>
               </a:r>
             </a:p>
           </p:txBody>
@@ -4928,7 +4893,7 @@
         </p:nvGrpSpPr>
         <p:grpSpPr>
           <a:xfrm>
-            <a:off x="11603607" y="6295650"/>
+            <a:off x="8794327" y="6049104"/>
             <a:ext cx="413075" cy="653809"/>
             <a:chOff x="510203" y="599076"/>
             <a:chExt cx="413075" cy="653809"/>
@@ -5014,7 +4979,7 @@
                     <a:schemeClr val="bg1"/>
                   </a:solidFill>
                 </a:rPr>
-                <a:t>7</a:t>
+                <a:t>2</a:t>
               </a:r>
             </a:p>
             <a:p>
@@ -5042,7 +5007,7 @@
         <p:spPr>
           <a:xfrm>
             <a:off x="1067691" y="1246245"/>
-            <a:ext cx="2353225" cy="1092607"/>
+            <a:ext cx="2353225" cy="892552"/>
           </a:xfrm>
           <a:prstGeom prst="rect">
             <a:avLst/>
@@ -5071,7 +5036,7 @@
             </a:r>
             <a:r>
               <a:rPr lang="pt-PT" sz="1300" i="1" dirty="0" err="1"/>
-              <a:t>viewer</a:t>
+              <a:t>streamer</a:t>
             </a:r>
             <a:endParaRPr lang="pt-PT" sz="1300" i="1" dirty="0"/>
           </a:p>
@@ -5083,47 +5048,374 @@
             </a:r>
             <a:r>
               <a:rPr lang="pt-PT" sz="1300" i="1" dirty="0" err="1"/>
-              <a:t>streamer</a:t>
+              <a:t>viewer</a:t>
             </a:r>
             <a:endParaRPr lang="pt-PT" sz="1300" i="1" dirty="0"/>
           </a:p>
-          <a:p>
-            <a:pPr algn="just"/>
-            <a:r>
-              <a:rPr lang="pt-PT" sz="1300" dirty="0"/>
-              <a:t>Menu do </a:t>
-            </a:r>
-            <a:r>
-              <a:rPr lang="pt-PT" sz="1300" i="1" dirty="0" err="1"/>
-              <a:t>admin</a:t>
-            </a:r>
-            <a:endParaRPr lang="pt-PT" sz="1300" i="1" dirty="0"/>
+        </p:txBody>
+      </p:sp>
+      <p:sp>
+        <p:nvSpPr>
+          <p:cNvPr id="3" name="CaixaDeTexto 2">
+            <a:extLst>
+              <a:ext uri="{FF2B5EF4-FFF2-40B4-BE49-F238E27FC236}">
+                <a16:creationId xmlns:a16="http://schemas.microsoft.com/office/drawing/2014/main" id="{7A5A7594-4CD8-4F78-B1B2-C67DB22743B7}"/>
+              </a:ext>
+            </a:extLst>
+          </p:cNvPr>
+          <p:cNvSpPr txBox="1"/>
+          <p:nvPr/>
+        </p:nvSpPr>
+        <p:spPr>
+          <a:xfrm>
+            <a:off x="4693745" y="1500010"/>
+            <a:ext cx="2804504" cy="830997"/>
+          </a:xfrm>
+          <a:prstGeom prst="rect">
+            <a:avLst/>
+          </a:prstGeom>
+          <a:noFill/>
+          <a:ln w="57150">
+            <a:solidFill>
+              <a:srgbClr val="E60000"/>
+            </a:solidFill>
+          </a:ln>
+        </p:spPr>
+        <p:txBody>
+          <a:bodyPr wrap="square" rtlCol="0">
+            <a:spAutoFit/>
+          </a:bodyPr>
+          <a:lstStyle/>
+          <a:p>
+            <a:pPr algn="ctr"/>
+            <a:r>
+              <a:rPr lang="pt-PT" sz="2400" dirty="0">
+                <a:solidFill>
+                  <a:schemeClr val="accent1">
+                    <a:lumMod val="75000"/>
+                  </a:schemeClr>
+                </a:solidFill>
+                <a:latin typeface="Impact" panose="020B0806030902050204" pitchFamily="34" charset="0"/>
+              </a:rPr>
+              <a:t>Novas Funcionalidades</a:t>
+            </a:r>
+          </a:p>
+        </p:txBody>
+      </p:sp>
+      <p:pic>
+        <p:nvPicPr>
+          <p:cNvPr id="21" name="Gráfico 20" descr="Distintivo 1 com preenchimento sólido">
+            <a:extLst>
+              <a:ext uri="{FF2B5EF4-FFF2-40B4-BE49-F238E27FC236}">
+                <a16:creationId xmlns:a16="http://schemas.microsoft.com/office/drawing/2014/main" id="{46534A43-88F7-44B8-8CB0-D49866CCF522}"/>
+              </a:ext>
+            </a:extLst>
+          </p:cNvPr>
+          <p:cNvPicPr>
+            <a:picLocks noChangeAspect="1"/>
+          </p:cNvPicPr>
+          <p:nvPr/>
+        </p:nvPicPr>
+        <p:blipFill>
+          <a:blip r:embed="rId4">
+            <a:extLst>
+              <a:ext uri="{28A0092B-C50C-407E-A947-70E740481C1C}">
+                <a14:useLocalDpi xmlns:a14="http://schemas.microsoft.com/office/drawing/2010/main" val="0"/>
+              </a:ext>
+              <a:ext uri="{96DAC541-7B7A-43D3-8B79-37D633B846F1}">
+                <asvg:svgBlip xmlns:asvg="http://schemas.microsoft.com/office/drawing/2016/SVG/main" r:embed="rId5"/>
+              </a:ext>
+            </a:extLst>
+          </a:blip>
+          <a:stretch>
+            <a:fillRect/>
+          </a:stretch>
+        </p:blipFill>
+        <p:spPr>
+          <a:xfrm>
+            <a:off x="929977" y="1696567"/>
+            <a:ext cx="202957" cy="202957"/>
+          </a:xfrm>
+          <a:prstGeom prst="rect">
+            <a:avLst/>
+          </a:prstGeom>
+        </p:spPr>
+      </p:pic>
+      <p:pic>
+        <p:nvPicPr>
+          <p:cNvPr id="23" name="Gráfico 22" descr="Distintivo com preenchimento sólido">
+            <a:extLst>
+              <a:ext uri="{FF2B5EF4-FFF2-40B4-BE49-F238E27FC236}">
+                <a16:creationId xmlns:a16="http://schemas.microsoft.com/office/drawing/2014/main" id="{0CE77F5B-8AD3-4932-A550-B7F2E90C479F}"/>
+              </a:ext>
+            </a:extLst>
+          </p:cNvPr>
+          <p:cNvPicPr>
+            <a:picLocks noChangeAspect="1"/>
+          </p:cNvPicPr>
+          <p:nvPr/>
+        </p:nvPicPr>
+        <p:blipFill>
+          <a:blip r:embed="rId6">
+            <a:extLst>
+              <a:ext uri="{28A0092B-C50C-407E-A947-70E740481C1C}">
+                <a14:useLocalDpi xmlns:a14="http://schemas.microsoft.com/office/drawing/2010/main" val="0"/>
+              </a:ext>
+              <a:ext uri="{96DAC541-7B7A-43D3-8B79-37D633B846F1}">
+                <asvg:svgBlip xmlns:asvg="http://schemas.microsoft.com/office/drawing/2016/SVG/main" r:embed="rId7"/>
+              </a:ext>
+            </a:extLst>
+          </a:blip>
+          <a:stretch>
+            <a:fillRect/>
+          </a:stretch>
+        </p:blipFill>
+        <p:spPr>
+          <a:xfrm>
+            <a:off x="929977" y="1905645"/>
+            <a:ext cx="202957" cy="202957"/>
+          </a:xfrm>
+          <a:prstGeom prst="rect">
+            <a:avLst/>
+          </a:prstGeom>
+        </p:spPr>
+      </p:pic>
+      <p:sp>
+        <p:nvSpPr>
+          <p:cNvPr id="50" name="Retângulo: Cantos Arredondados 49">
+            <a:extLst>
+              <a:ext uri="{FF2B5EF4-FFF2-40B4-BE49-F238E27FC236}">
+                <a16:creationId xmlns:a16="http://schemas.microsoft.com/office/drawing/2014/main" id="{64DDFD45-DDC7-4287-9832-6149388EB0F7}"/>
+              </a:ext>
+            </a:extLst>
+          </p:cNvPr>
+          <p:cNvSpPr/>
+          <p:nvPr/>
+        </p:nvSpPr>
+        <p:spPr>
+          <a:xfrm>
+            <a:off x="2405849" y="5388746"/>
+            <a:ext cx="1260629" cy="223009"/>
+          </a:xfrm>
+          <a:prstGeom prst="roundRect">
+            <a:avLst/>
+          </a:prstGeom>
+          <a:noFill/>
+          <a:ln w="38100">
+            <a:solidFill>
+              <a:srgbClr val="FFC000"/>
+            </a:solidFill>
+          </a:ln>
+        </p:spPr>
+        <p:style>
+          <a:lnRef idx="2">
+            <a:schemeClr val="accent1">
+              <a:shade val="50000"/>
+            </a:schemeClr>
+          </a:lnRef>
+          <a:fillRef idx="1">
+            <a:schemeClr val="accent1"/>
+          </a:fillRef>
+          <a:effectRef idx="0">
+            <a:schemeClr val="accent1"/>
+          </a:effectRef>
+          <a:fontRef idx="minor">
+            <a:schemeClr val="lt1"/>
+          </a:fontRef>
+        </p:style>
+        <p:txBody>
+          <a:bodyPr rtlCol="0" anchor="ctr"/>
+          <a:lstStyle/>
+          <a:p>
+            <a:pPr algn="ctr"/>
+            <a:endParaRPr lang="pt-PT" dirty="0"/>
+          </a:p>
+        </p:txBody>
+      </p:sp>
+      <p:sp>
+        <p:nvSpPr>
+          <p:cNvPr id="61" name="Retângulo: Cantos Arredondados 60">
+            <a:extLst>
+              <a:ext uri="{FF2B5EF4-FFF2-40B4-BE49-F238E27FC236}">
+                <a16:creationId xmlns:a16="http://schemas.microsoft.com/office/drawing/2014/main" id="{518E19C0-1BEB-4C70-A783-D32BB00C9568}"/>
+              </a:ext>
+            </a:extLst>
+          </p:cNvPr>
+          <p:cNvSpPr/>
+          <p:nvPr/>
+        </p:nvSpPr>
+        <p:spPr>
+          <a:xfrm>
+            <a:off x="7201870" y="5244179"/>
+            <a:ext cx="1229619" cy="215678"/>
+          </a:xfrm>
+          <a:prstGeom prst="roundRect">
+            <a:avLst/>
+          </a:prstGeom>
+          <a:noFill/>
+          <a:ln w="38100">
+            <a:solidFill>
+              <a:srgbClr val="FFC000"/>
+            </a:solidFill>
+          </a:ln>
+        </p:spPr>
+        <p:style>
+          <a:lnRef idx="2">
+            <a:schemeClr val="accent1">
+              <a:shade val="50000"/>
+            </a:schemeClr>
+          </a:lnRef>
+          <a:fillRef idx="1">
+            <a:schemeClr val="accent1"/>
+          </a:fillRef>
+          <a:effectRef idx="0">
+            <a:schemeClr val="accent1"/>
+          </a:effectRef>
+          <a:fontRef idx="minor">
+            <a:schemeClr val="lt1"/>
+          </a:fontRef>
+        </p:style>
+        <p:txBody>
+          <a:bodyPr rtlCol="0" anchor="ctr"/>
+          <a:lstStyle/>
+          <a:p>
+            <a:pPr algn="ctr"/>
+            <a:endParaRPr lang="pt-PT" dirty="0"/>
+          </a:p>
+        </p:txBody>
+      </p:sp>
+      <p:sp>
+        <p:nvSpPr>
+          <p:cNvPr id="62" name="Retângulo: Cantos Arredondados 61">
+            <a:extLst>
+              <a:ext uri="{FF2B5EF4-FFF2-40B4-BE49-F238E27FC236}">
+                <a16:creationId xmlns:a16="http://schemas.microsoft.com/office/drawing/2014/main" id="{5249DAB9-C0EA-471F-B628-E30E97C5B562}"/>
+              </a:ext>
+            </a:extLst>
+          </p:cNvPr>
+          <p:cNvSpPr/>
+          <p:nvPr/>
+        </p:nvSpPr>
+        <p:spPr>
+          <a:xfrm>
+            <a:off x="7207086" y="5670306"/>
+            <a:ext cx="1229619" cy="159799"/>
+          </a:xfrm>
+          <a:prstGeom prst="roundRect">
+            <a:avLst/>
+          </a:prstGeom>
+          <a:noFill/>
+          <a:ln w="38100">
+            <a:solidFill>
+              <a:srgbClr val="FFC000"/>
+            </a:solidFill>
+          </a:ln>
+        </p:spPr>
+        <p:style>
+          <a:lnRef idx="2">
+            <a:schemeClr val="accent1">
+              <a:shade val="50000"/>
+            </a:schemeClr>
+          </a:lnRef>
+          <a:fillRef idx="1">
+            <a:schemeClr val="accent1"/>
+          </a:fillRef>
+          <a:effectRef idx="0">
+            <a:schemeClr val="accent1"/>
+          </a:effectRef>
+          <a:fontRef idx="minor">
+            <a:schemeClr val="lt1"/>
+          </a:fontRef>
+        </p:style>
+        <p:txBody>
+          <a:bodyPr rtlCol="0" anchor="ctr"/>
+          <a:lstStyle/>
+          <a:p>
+            <a:pPr algn="ctr"/>
+            <a:endParaRPr lang="pt-PT" dirty="0"/>
+          </a:p>
+        </p:txBody>
+      </p:sp>
+      <p:sp>
+        <p:nvSpPr>
+          <p:cNvPr id="63" name="Retângulo: Cantos Arredondados 62">
+            <a:extLst>
+              <a:ext uri="{FF2B5EF4-FFF2-40B4-BE49-F238E27FC236}">
+                <a16:creationId xmlns:a16="http://schemas.microsoft.com/office/drawing/2014/main" id="{7F86C996-E6A0-408F-8FFB-29A7CA272B1E}"/>
+              </a:ext>
+            </a:extLst>
+          </p:cNvPr>
+          <p:cNvSpPr/>
+          <p:nvPr/>
+        </p:nvSpPr>
+        <p:spPr>
+          <a:xfrm>
+            <a:off x="7201870" y="5454628"/>
+            <a:ext cx="1229619" cy="215678"/>
+          </a:xfrm>
+          <a:prstGeom prst="roundRect">
+            <a:avLst/>
+          </a:prstGeom>
+          <a:noFill/>
+          <a:ln w="38100">
+            <a:solidFill>
+              <a:srgbClr val="FFC000"/>
+            </a:solidFill>
+          </a:ln>
+        </p:spPr>
+        <p:style>
+          <a:lnRef idx="2">
+            <a:schemeClr val="accent1">
+              <a:shade val="50000"/>
+            </a:schemeClr>
+          </a:lnRef>
+          <a:fillRef idx="1">
+            <a:schemeClr val="accent1"/>
+          </a:fillRef>
+          <a:effectRef idx="0">
+            <a:schemeClr val="accent1"/>
+          </a:effectRef>
+          <a:fontRef idx="minor">
+            <a:schemeClr val="lt1"/>
+          </a:fontRef>
+        </p:style>
+        <p:txBody>
+          <a:bodyPr rtlCol="0" anchor="ctr"/>
+          <a:lstStyle/>
+          <a:p>
+            <a:pPr algn="ctr"/>
+            <a:endParaRPr lang="pt-PT" dirty="0"/>
           </a:p>
         </p:txBody>
       </p:sp>
       <p:cxnSp>
         <p:nvCxnSpPr>
-          <p:cNvPr id="41" name="Conexão: Ângulo Reto 40">
-            <a:extLst>
-              <a:ext uri="{FF2B5EF4-FFF2-40B4-BE49-F238E27FC236}">
-                <a16:creationId xmlns:a16="http://schemas.microsoft.com/office/drawing/2014/main" id="{EEEDD055-C0F4-4970-ACA1-5A9D31C3375F}"/>
+          <p:cNvPr id="52" name="Conexão: Curva 51">
+            <a:extLst>
+              <a:ext uri="{FF2B5EF4-FFF2-40B4-BE49-F238E27FC236}">
+                <a16:creationId xmlns:a16="http://schemas.microsoft.com/office/drawing/2014/main" id="{4F0F27EF-6BB5-4C0E-BE4D-D8FA19E718B7}"/>
               </a:ext>
             </a:extLst>
           </p:cNvPr>
           <p:cNvCxnSpPr>
             <a:cxnSpLocks/>
+            <a:stCxn id="50" idx="1"/>
+            <a:endCxn id="64" idx="2"/>
           </p:cNvCxnSpPr>
           <p:nvPr/>
         </p:nvCxnSpPr>
         <p:spPr>
-          <a:xfrm>
-            <a:off x="6475228" y="2849526"/>
-            <a:ext cx="0" cy="1155447"/>
+          <a:xfrm rot="10800000">
+            <a:off x="1351427" y="4698963"/>
+            <a:ext cx="1054422" cy="801288"/>
           </a:xfrm>
-          <a:prstGeom prst="straightConnector1">
+          <a:prstGeom prst="curvedConnector2">
             <a:avLst/>
           </a:prstGeom>
           <a:ln w="38100">
+            <a:solidFill>
+              <a:srgbClr val="FFC000"/>
+            </a:solidFill>
             <a:tailEnd type="triangle"/>
           </a:ln>
         </p:spPr>
@@ -5142,226 +5434,154 @@
           </a:fontRef>
         </p:style>
       </p:cxnSp>
-      <p:pic>
-        <p:nvPicPr>
-          <p:cNvPr id="4" name="Imagem 3" descr="Uma imagem com texto&#10;&#10;Descrição gerada automaticamente">
-            <a:extLst>
-              <a:ext uri="{FF2B5EF4-FFF2-40B4-BE49-F238E27FC236}">
-                <a16:creationId xmlns:a16="http://schemas.microsoft.com/office/drawing/2014/main" id="{2EBE558A-A9F3-4F18-A69B-14CAEB4376A3}"/>
-              </a:ext>
-            </a:extLst>
-          </p:cNvPr>
-          <p:cNvPicPr>
-            <a:picLocks noChangeAspect="1"/>
-          </p:cNvPicPr>
+      <p:cxnSp>
+        <p:nvCxnSpPr>
+          <p:cNvPr id="54" name="Conexão: Curva 53">
+            <a:extLst>
+              <a:ext uri="{FF2B5EF4-FFF2-40B4-BE49-F238E27FC236}">
+                <a16:creationId xmlns:a16="http://schemas.microsoft.com/office/drawing/2014/main" id="{6C7B4ADF-84A6-4904-8FBC-5ACE2E87DA48}"/>
+              </a:ext>
+            </a:extLst>
+          </p:cNvPr>
+          <p:cNvCxnSpPr>
+            <a:cxnSpLocks/>
+            <a:stCxn id="61" idx="3"/>
+            <a:endCxn id="76" idx="2"/>
+          </p:cNvCxnSpPr>
           <p:nvPr/>
-        </p:nvPicPr>
-        <p:blipFill>
-          <a:blip r:embed="rId5">
-            <a:extLst>
-              <a:ext uri="{28A0092B-C50C-407E-A947-70E740481C1C}">
-                <a14:useLocalDpi xmlns:a14="http://schemas.microsoft.com/office/drawing/2010/main" val="0"/>
-              </a:ext>
-            </a:extLst>
-          </a:blip>
-          <a:stretch>
-            <a:fillRect/>
-          </a:stretch>
-        </p:blipFill>
+        </p:nvCxnSpPr>
+        <p:spPr>
+          <a:xfrm flipV="1">
+            <a:off x="8431489" y="4126300"/>
+            <a:ext cx="1349342" cy="1225718"/>
+          </a:xfrm>
+          <a:prstGeom prst="curvedConnector2">
+            <a:avLst/>
+          </a:prstGeom>
+          <a:ln w="57150">
+            <a:solidFill>
+              <a:srgbClr val="FFC000"/>
+            </a:solidFill>
+            <a:tailEnd type="triangle"/>
+          </a:ln>
+        </p:spPr>
+        <p:style>
+          <a:lnRef idx="1">
+            <a:schemeClr val="accent1"/>
+          </a:lnRef>
+          <a:fillRef idx="0">
+            <a:schemeClr val="accent1"/>
+          </a:fillRef>
+          <a:effectRef idx="0">
+            <a:schemeClr val="accent1"/>
+          </a:effectRef>
+          <a:fontRef idx="minor">
+            <a:schemeClr val="tx1"/>
+          </a:fontRef>
+        </p:style>
+      </p:cxnSp>
+      <p:cxnSp>
+        <p:nvCxnSpPr>
+          <p:cNvPr id="57" name="Conexão: Curva 56">
+            <a:extLst>
+              <a:ext uri="{FF2B5EF4-FFF2-40B4-BE49-F238E27FC236}">
+                <a16:creationId xmlns:a16="http://schemas.microsoft.com/office/drawing/2014/main" id="{D95FADF3-8856-4956-835B-8EFF4D88A81B}"/>
+              </a:ext>
+            </a:extLst>
+          </p:cNvPr>
+          <p:cNvCxnSpPr>
+            <a:cxnSpLocks/>
+            <a:stCxn id="63" idx="1"/>
+            <a:endCxn id="81" idx="3"/>
+          </p:cNvCxnSpPr>
+          <p:nvPr/>
+        </p:nvCxnSpPr>
+        <p:spPr>
+          <a:xfrm rot="10800000">
+            <a:off x="6786490" y="5257217"/>
+            <a:ext cx="415381" cy="305251"/>
+          </a:xfrm>
+          <a:prstGeom prst="curvedConnector3">
+            <a:avLst>
+              <a:gd name="adj1" fmla="val 50000"/>
+            </a:avLst>
+          </a:prstGeom>
+          <a:ln w="38100">
+            <a:solidFill>
+              <a:srgbClr val="FFC000"/>
+            </a:solidFill>
+            <a:tailEnd type="triangle"/>
+          </a:ln>
+        </p:spPr>
+        <p:style>
+          <a:lnRef idx="1">
+            <a:schemeClr val="accent1"/>
+          </a:lnRef>
+          <a:fillRef idx="0">
+            <a:schemeClr val="accent1"/>
+          </a:fillRef>
+          <a:effectRef idx="0">
+            <a:schemeClr val="accent1"/>
+          </a:effectRef>
+          <a:fontRef idx="minor">
+            <a:schemeClr val="tx1"/>
+          </a:fontRef>
+        </p:style>
+      </p:cxnSp>
+      <p:cxnSp>
+        <p:nvCxnSpPr>
+          <p:cNvPr id="60" name="Conexão: Curva 59">
+            <a:extLst>
+              <a:ext uri="{FF2B5EF4-FFF2-40B4-BE49-F238E27FC236}">
+                <a16:creationId xmlns:a16="http://schemas.microsoft.com/office/drawing/2014/main" id="{D6059466-61B8-4965-BC5C-A74901C9C8D4}"/>
+              </a:ext>
+            </a:extLst>
+          </p:cNvPr>
+          <p:cNvCxnSpPr>
+            <a:cxnSpLocks/>
+            <a:stCxn id="62" idx="3"/>
+            <a:endCxn id="74" idx="1"/>
+          </p:cNvCxnSpPr>
+          <p:nvPr/>
+        </p:nvCxnSpPr>
         <p:spPr>
           <a:xfrm>
-            <a:off x="2813955" y="3232697"/>
-            <a:ext cx="2004234" cy="2392887"/>
+            <a:off x="8436705" y="5750206"/>
+            <a:ext cx="847228" cy="162832"/>
           </a:xfrm>
-          <a:prstGeom prst="rect">
-            <a:avLst/>
+          <a:prstGeom prst="curvedConnector3">
+            <a:avLst>
+              <a:gd name="adj1" fmla="val 50000"/>
+            </a:avLst>
           </a:prstGeom>
+          <a:ln w="38100">
+            <a:solidFill>
+              <a:srgbClr val="FFC000"/>
+            </a:solidFill>
+            <a:tailEnd type="triangle"/>
+          </a:ln>
         </p:spPr>
-      </p:pic>
-      <p:pic>
-        <p:nvPicPr>
-          <p:cNvPr id="6" name="Imagem 5" descr="Uma imagem com texto&#10;&#10;Descrição gerada automaticamente">
-            <a:extLst>
-              <a:ext uri="{FF2B5EF4-FFF2-40B4-BE49-F238E27FC236}">
-                <a16:creationId xmlns:a16="http://schemas.microsoft.com/office/drawing/2014/main" id="{A26AD443-B548-4E35-ABC1-E31CEFFC45F0}"/>
-              </a:ext>
-            </a:extLst>
-          </p:cNvPr>
-          <p:cNvPicPr>
-            <a:picLocks noChangeAspect="1"/>
-          </p:cNvPicPr>
-          <p:nvPr/>
-        </p:nvPicPr>
-        <p:blipFill>
-          <a:blip r:embed="rId6">
-            <a:extLst>
-              <a:ext uri="{28A0092B-C50C-407E-A947-70E740481C1C}">
-                <a14:useLocalDpi xmlns:a14="http://schemas.microsoft.com/office/drawing/2010/main" val="0"/>
-              </a:ext>
-            </a:extLst>
-          </a:blip>
-          <a:stretch>
-            <a:fillRect/>
-          </a:stretch>
-        </p:blipFill>
-        <p:spPr>
-          <a:xfrm>
-            <a:off x="10477342" y="3232697"/>
-            <a:ext cx="1459360" cy="1837493"/>
-          </a:xfrm>
-          <a:prstGeom prst="rect">
-            <a:avLst/>
-          </a:prstGeom>
-        </p:spPr>
-      </p:pic>
-      <p:pic>
-        <p:nvPicPr>
-          <p:cNvPr id="9" name="Imagem 8" descr="Uma imagem com texto&#10;&#10;Descrição gerada automaticamente">
-            <a:extLst>
-              <a:ext uri="{FF2B5EF4-FFF2-40B4-BE49-F238E27FC236}">
-                <a16:creationId xmlns:a16="http://schemas.microsoft.com/office/drawing/2014/main" id="{9F618556-372B-4F8D-A31C-832DAA53E994}"/>
-              </a:ext>
-            </a:extLst>
-          </p:cNvPr>
-          <p:cNvPicPr>
-            <a:picLocks noChangeAspect="1"/>
-          </p:cNvPicPr>
-          <p:nvPr/>
-        </p:nvPicPr>
-        <p:blipFill>
-          <a:blip r:embed="rId7">
-            <a:extLst>
-              <a:ext uri="{28A0092B-C50C-407E-A947-70E740481C1C}">
-                <a14:useLocalDpi xmlns:a14="http://schemas.microsoft.com/office/drawing/2010/main" val="0"/>
-              </a:ext>
-            </a:extLst>
-          </a:blip>
-          <a:stretch>
-            <a:fillRect/>
-          </a:stretch>
-        </p:blipFill>
-        <p:spPr>
-          <a:xfrm>
-            <a:off x="5670681" y="4022851"/>
-            <a:ext cx="1686385" cy="2316065"/>
-          </a:xfrm>
-          <a:prstGeom prst="rect">
-            <a:avLst/>
-          </a:prstGeom>
-        </p:spPr>
-      </p:pic>
-      <p:grpSp>
-        <p:nvGrpSpPr>
-          <p:cNvPr id="46" name="Agrupar 45">
-            <a:extLst>
-              <a:ext uri="{FF2B5EF4-FFF2-40B4-BE49-F238E27FC236}">
-                <a16:creationId xmlns:a16="http://schemas.microsoft.com/office/drawing/2014/main" id="{7CE4E5AE-00FA-44E0-9440-2E8046385397}"/>
-              </a:ext>
-            </a:extLst>
-          </p:cNvPr>
-          <p:cNvGrpSpPr/>
-          <p:nvPr/>
-        </p:nvGrpSpPr>
-        <p:grpSpPr>
-          <a:xfrm>
-            <a:off x="7068946" y="6291048"/>
-            <a:ext cx="413075" cy="369705"/>
-            <a:chOff x="510203" y="599076"/>
-            <a:chExt cx="413075" cy="369705"/>
-          </a:xfrm>
-        </p:grpSpPr>
-        <p:sp>
-          <p:nvSpPr>
-            <p:cNvPr id="48" name="Oval 47">
-              <a:extLst>
-                <a:ext uri="{FF2B5EF4-FFF2-40B4-BE49-F238E27FC236}">
-                  <a16:creationId xmlns:a16="http://schemas.microsoft.com/office/drawing/2014/main" id="{702F8281-CB39-423F-8775-F2B88CC307EB}"/>
-                </a:ext>
-              </a:extLst>
-            </p:cNvPr>
-            <p:cNvSpPr/>
-            <p:nvPr/>
-          </p:nvSpPr>
-          <p:spPr>
-            <a:xfrm>
-              <a:off x="510203" y="599076"/>
-              <a:ext cx="413075" cy="369332"/>
-            </a:xfrm>
-            <a:prstGeom prst="ellipse">
-              <a:avLst/>
-            </a:prstGeom>
-          </p:spPr>
-          <p:style>
-            <a:lnRef idx="2">
-              <a:schemeClr val="accent1">
-                <a:shade val="50000"/>
-              </a:schemeClr>
-            </a:lnRef>
-            <a:fillRef idx="1">
-              <a:schemeClr val="accent1"/>
-            </a:fillRef>
-            <a:effectRef idx="0">
-              <a:schemeClr val="accent1"/>
-            </a:effectRef>
-            <a:fontRef idx="minor">
-              <a:schemeClr val="lt1"/>
-            </a:fontRef>
-          </p:style>
-          <p:txBody>
-            <a:bodyPr rtlCol="0" anchor="ctr"/>
-            <a:lstStyle/>
-            <a:p>
-              <a:pPr algn="ctr"/>
-              <a:endParaRPr lang="pt-PT"/>
-            </a:p>
-          </p:txBody>
-        </p:sp>
-        <p:sp>
-          <p:nvSpPr>
-            <p:cNvPr id="49" name="CaixaDeTexto 48">
-              <a:extLst>
-                <a:ext uri="{FF2B5EF4-FFF2-40B4-BE49-F238E27FC236}">
-                  <a16:creationId xmlns:a16="http://schemas.microsoft.com/office/drawing/2014/main" id="{F1A5DD42-B7E5-4A55-8296-24B688D036FA}"/>
-                </a:ext>
-              </a:extLst>
-            </p:cNvPr>
-            <p:cNvSpPr txBox="1"/>
-            <p:nvPr/>
-          </p:nvSpPr>
-          <p:spPr>
-            <a:xfrm>
-              <a:off x="572224" y="599449"/>
-              <a:ext cx="274523" cy="369332"/>
-            </a:xfrm>
-            <a:prstGeom prst="rect">
-              <a:avLst/>
-            </a:prstGeom>
-            <a:noFill/>
-          </p:spPr>
-          <p:txBody>
-            <a:bodyPr wrap="square" rtlCol="0">
-              <a:spAutoFit/>
-            </a:bodyPr>
-            <a:lstStyle/>
-            <a:p>
-              <a:r>
-                <a:rPr lang="pt-PT" b="1" dirty="0">
-                  <a:solidFill>
-                    <a:schemeClr val="bg1"/>
-                  </a:solidFill>
-                </a:rPr>
-                <a:t>8</a:t>
-              </a:r>
-            </a:p>
-          </p:txBody>
-        </p:sp>
-      </p:grpSp>
+        <p:style>
+          <a:lnRef idx="1">
+            <a:schemeClr val="accent1"/>
+          </a:lnRef>
+          <a:fillRef idx="0">
+            <a:schemeClr val="accent1"/>
+          </a:fillRef>
+          <a:effectRef idx="0">
+            <a:schemeClr val="accent1"/>
+          </a:effectRef>
+          <a:fontRef idx="minor">
+            <a:schemeClr val="tx1"/>
+          </a:fontRef>
+        </p:style>
+      </p:cxnSp>
       <p:sp>
         <p:nvSpPr>
-          <p:cNvPr id="29" name="CaixaDeTexto 28">
-            <a:extLst>
-              <a:ext uri="{FF2B5EF4-FFF2-40B4-BE49-F238E27FC236}">
-                <a16:creationId xmlns:a16="http://schemas.microsoft.com/office/drawing/2014/main" id="{582DD70B-E3A9-4A45-8509-6602C7B0F932}"/>
+          <p:cNvPr id="64" name="CaixaDeTexto 63">
+            <a:extLst>
+              <a:ext uri="{FF2B5EF4-FFF2-40B4-BE49-F238E27FC236}">
+                <a16:creationId xmlns:a16="http://schemas.microsoft.com/office/drawing/2014/main" id="{0987E646-DE1C-40B8-AF79-941EB6986571}"/>
               </a:ext>
             </a:extLst>
           </p:cNvPr>
@@ -5370,8 +5590,212 @@
         </p:nvSpPr>
         <p:spPr>
           <a:xfrm>
-            <a:off x="897226" y="3880269"/>
-            <a:ext cx="425820" cy="369332"/>
+            <a:off x="559802" y="3867966"/>
+            <a:ext cx="1583249" cy="830997"/>
+          </a:xfrm>
+          <a:prstGeom prst="rect">
+            <a:avLst/>
+          </a:prstGeom>
+          <a:noFill/>
+          <a:ln>
+            <a:solidFill>
+              <a:schemeClr val="tx1"/>
+            </a:solidFill>
+            <a:prstDash val="lgDash"/>
+          </a:ln>
+        </p:spPr>
+        <p:txBody>
+          <a:bodyPr wrap="square" rtlCol="0">
+            <a:spAutoFit/>
+          </a:bodyPr>
+          <a:lstStyle/>
+          <a:p>
+            <a:r>
+              <a:rPr lang="pt-PT" sz="1200" dirty="0"/>
+              <a:t>Opção para os </a:t>
+            </a:r>
+            <a:r>
+              <a:rPr lang="pt-PT" sz="1200" i="1" dirty="0" err="1"/>
+              <a:t>streamers</a:t>
+            </a:r>
+            <a:r>
+              <a:rPr lang="pt-PT" sz="1200" dirty="0"/>
+              <a:t> venderem produtos através da plataforma</a:t>
+            </a:r>
+          </a:p>
+        </p:txBody>
+      </p:sp>
+      <p:sp>
+        <p:nvSpPr>
+          <p:cNvPr id="74" name="CaixaDeTexto 73">
+            <a:extLst>
+              <a:ext uri="{FF2B5EF4-FFF2-40B4-BE49-F238E27FC236}">
+                <a16:creationId xmlns:a16="http://schemas.microsoft.com/office/drawing/2014/main" id="{44681A8B-F672-402C-B487-19556880EC3D}"/>
+              </a:ext>
+            </a:extLst>
+          </p:cNvPr>
+          <p:cNvSpPr txBox="1"/>
+          <p:nvPr/>
+        </p:nvSpPr>
+        <p:spPr>
+          <a:xfrm>
+            <a:off x="9283933" y="5497539"/>
+            <a:ext cx="1239934" cy="830997"/>
+          </a:xfrm>
+          <a:prstGeom prst="rect">
+            <a:avLst/>
+          </a:prstGeom>
+          <a:noFill/>
+          <a:ln>
+            <a:solidFill>
+              <a:schemeClr val="tx1"/>
+            </a:solidFill>
+            <a:prstDash val="lgDash"/>
+          </a:ln>
+        </p:spPr>
+        <p:txBody>
+          <a:bodyPr wrap="square" rtlCol="0">
+            <a:spAutoFit/>
+          </a:bodyPr>
+          <a:lstStyle/>
+          <a:p>
+            <a:r>
+              <a:rPr lang="pt-PT" sz="1200" dirty="0"/>
+              <a:t>Os </a:t>
+            </a:r>
+            <a:r>
+              <a:rPr lang="pt-PT" sz="1200" i="1" dirty="0" err="1"/>
+              <a:t>viewers</a:t>
+            </a:r>
+            <a:r>
+              <a:rPr lang="pt-PT" sz="1200" dirty="0"/>
+              <a:t> podem agora fazer donativos aos </a:t>
+            </a:r>
+            <a:r>
+              <a:rPr lang="pt-PT" sz="1200" i="1" dirty="0" err="1"/>
+              <a:t>streamers</a:t>
+            </a:r>
+            <a:r>
+              <a:rPr lang="pt-PT" sz="1200" dirty="0"/>
+              <a:t> </a:t>
+            </a:r>
+          </a:p>
+        </p:txBody>
+      </p:sp>
+      <p:sp>
+        <p:nvSpPr>
+          <p:cNvPr id="76" name="CaixaDeTexto 75">
+            <a:extLst>
+              <a:ext uri="{FF2B5EF4-FFF2-40B4-BE49-F238E27FC236}">
+                <a16:creationId xmlns:a16="http://schemas.microsoft.com/office/drawing/2014/main" id="{5B337616-028F-48D8-B8C2-E902ECFFB85A}"/>
+              </a:ext>
+            </a:extLst>
+          </p:cNvPr>
+          <p:cNvSpPr txBox="1"/>
+          <p:nvPr/>
+        </p:nvSpPr>
+        <p:spPr>
+          <a:xfrm>
+            <a:off x="9067814" y="3295303"/>
+            <a:ext cx="1426034" cy="830997"/>
+          </a:xfrm>
+          <a:prstGeom prst="rect">
+            <a:avLst/>
+          </a:prstGeom>
+          <a:noFill/>
+          <a:ln>
+            <a:solidFill>
+              <a:schemeClr val="tx1"/>
+            </a:solidFill>
+            <a:prstDash val="lgDash"/>
+          </a:ln>
+        </p:spPr>
+        <p:txBody>
+          <a:bodyPr wrap="square" rtlCol="0">
+            <a:spAutoFit/>
+          </a:bodyPr>
+          <a:lstStyle/>
+          <a:p>
+            <a:r>
+              <a:rPr lang="pt-PT" sz="1200" dirty="0"/>
+              <a:t>Opção para os </a:t>
+            </a:r>
+            <a:r>
+              <a:rPr lang="pt-PT" sz="1200" i="1" dirty="0" err="1"/>
+              <a:t>viewers</a:t>
+            </a:r>
+            <a:r>
+              <a:rPr lang="pt-PT" sz="1200" dirty="0"/>
+              <a:t> comprarem os produtos disponíveis</a:t>
+            </a:r>
+          </a:p>
+        </p:txBody>
+      </p:sp>
+      <p:sp>
+        <p:nvSpPr>
+          <p:cNvPr id="81" name="CaixaDeTexto 80">
+            <a:extLst>
+              <a:ext uri="{FF2B5EF4-FFF2-40B4-BE49-F238E27FC236}">
+                <a16:creationId xmlns:a16="http://schemas.microsoft.com/office/drawing/2014/main" id="{9E3304F4-6DE9-40AD-9EC6-74B71009E42D}"/>
+              </a:ext>
+            </a:extLst>
+          </p:cNvPr>
+          <p:cNvSpPr txBox="1"/>
+          <p:nvPr/>
+        </p:nvSpPr>
+        <p:spPr>
+          <a:xfrm>
+            <a:off x="5746061" y="4564718"/>
+            <a:ext cx="1040428" cy="1384995"/>
+          </a:xfrm>
+          <a:prstGeom prst="rect">
+            <a:avLst/>
+          </a:prstGeom>
+          <a:noFill/>
+          <a:ln>
+            <a:solidFill>
+              <a:schemeClr val="tx1"/>
+            </a:solidFill>
+            <a:prstDash val="lgDash"/>
+          </a:ln>
+        </p:spPr>
+        <p:txBody>
+          <a:bodyPr wrap="square" rtlCol="0">
+            <a:spAutoFit/>
+          </a:bodyPr>
+          <a:lstStyle/>
+          <a:p>
+            <a:r>
+              <a:rPr lang="pt-PT" sz="1200" dirty="0"/>
+              <a:t>Os </a:t>
+            </a:r>
+            <a:r>
+              <a:rPr lang="pt-PT" sz="1200" i="1" dirty="0" err="1"/>
+              <a:t>viewers</a:t>
+            </a:r>
+            <a:r>
+              <a:rPr lang="pt-PT" sz="1200" dirty="0"/>
+              <a:t> podem também cancelar a sua compra a qualquer momento</a:t>
+            </a:r>
+          </a:p>
+        </p:txBody>
+      </p:sp>
+      <p:sp>
+        <p:nvSpPr>
+          <p:cNvPr id="4" name="CaixaDeTexto 3">
+            <a:extLst>
+              <a:ext uri="{FF2B5EF4-FFF2-40B4-BE49-F238E27FC236}">
+                <a16:creationId xmlns:a16="http://schemas.microsoft.com/office/drawing/2014/main" id="{C7E412F6-E6BE-47BD-B2FF-FD8B202684BF}"/>
+              </a:ext>
+            </a:extLst>
+          </p:cNvPr>
+          <p:cNvSpPr txBox="1"/>
+          <p:nvPr/>
+        </p:nvSpPr>
+        <p:spPr>
+          <a:xfrm>
+            <a:off x="9000864" y="2108602"/>
+            <a:ext cx="2760842" cy="954107"/>
           </a:xfrm>
           <a:prstGeom prst="rect">
             <a:avLst/>
@@ -5385,164 +5809,24 @@
           <a:lstStyle/>
           <a:p>
             <a:r>
-              <a:rPr lang="pt-PT" dirty="0"/>
-              <a:t>*</a:t>
+              <a:rPr lang="pt-PT" sz="1400" b="1" dirty="0"/>
+              <a:t>Nota</a:t>
+            </a:r>
+            <a:r>
+              <a:rPr lang="pt-PT" sz="1400" dirty="0"/>
+              <a:t>: Certas listagens agora também mais eficientes na </a:t>
+            </a:r>
+            <a:r>
+              <a:rPr lang="pt-PT" sz="1400" i="1" dirty="0" err="1"/>
+              <a:t>framework</a:t>
+            </a:r>
+            <a:r>
+              <a:rPr lang="pt-PT" sz="1400" dirty="0"/>
+              <a:t> com o uso das novas estruturas de dados!</a:t>
             </a:r>
           </a:p>
         </p:txBody>
       </p:sp>
-      <p:sp>
-        <p:nvSpPr>
-          <p:cNvPr id="30" name="CaixaDeTexto 29">
-            <a:extLst>
-              <a:ext uri="{FF2B5EF4-FFF2-40B4-BE49-F238E27FC236}">
-                <a16:creationId xmlns:a16="http://schemas.microsoft.com/office/drawing/2014/main" id="{71473274-FC68-4965-8DC3-85B32D8783D9}"/>
-              </a:ext>
-            </a:extLst>
-          </p:cNvPr>
-          <p:cNvSpPr txBox="1"/>
-          <p:nvPr/>
-        </p:nvSpPr>
-        <p:spPr>
-          <a:xfrm>
-            <a:off x="7806721" y="3774717"/>
-            <a:ext cx="425820" cy="369332"/>
-          </a:xfrm>
-          <a:prstGeom prst="rect">
-            <a:avLst/>
-          </a:prstGeom>
-          <a:noFill/>
-        </p:spPr>
-        <p:txBody>
-          <a:bodyPr wrap="square" rtlCol="0">
-            <a:spAutoFit/>
-          </a:bodyPr>
-          <a:lstStyle/>
-          <a:p>
-            <a:r>
-              <a:rPr lang="pt-PT" dirty="0"/>
-              <a:t>*</a:t>
-            </a:r>
-          </a:p>
-        </p:txBody>
-      </p:sp>
-      <p:pic>
-        <p:nvPicPr>
-          <p:cNvPr id="25" name="Gráfico 24" descr="Distintivo 8">
-            <a:extLst>
-              <a:ext uri="{FF2B5EF4-FFF2-40B4-BE49-F238E27FC236}">
-                <a16:creationId xmlns:a16="http://schemas.microsoft.com/office/drawing/2014/main" id="{D81F15B9-E425-4181-9010-59D8FA948AA7}"/>
-              </a:ext>
-            </a:extLst>
-          </p:cNvPr>
-          <p:cNvPicPr>
-            <a:picLocks noChangeAspect="1"/>
-          </p:cNvPicPr>
-          <p:nvPr/>
-        </p:nvPicPr>
-        <p:blipFill>
-          <a:blip r:embed="rId8">
-            <a:extLst>
-              <a:ext uri="{28A0092B-C50C-407E-A947-70E740481C1C}">
-                <a14:useLocalDpi xmlns:a14="http://schemas.microsoft.com/office/drawing/2010/main" val="0"/>
-              </a:ext>
-              <a:ext uri="{96DAC541-7B7A-43D3-8B79-37D633B846F1}">
-                <asvg:svgBlip xmlns:asvg="http://schemas.microsoft.com/office/drawing/2016/SVG/main" r:embed="rId9"/>
-              </a:ext>
-            </a:extLst>
-          </a:blip>
-          <a:stretch>
-            <a:fillRect/>
-          </a:stretch>
-        </p:blipFill>
-        <p:spPr>
-          <a:xfrm>
-            <a:off x="903668" y="2090365"/>
-            <a:ext cx="213681" cy="213681"/>
-          </a:xfrm>
-          <a:prstGeom prst="rect">
-            <a:avLst/>
-          </a:prstGeom>
-        </p:spPr>
-      </p:pic>
-      <p:pic>
-        <p:nvPicPr>
-          <p:cNvPr id="26" name="Gráfico 25" descr="Distintivo 6">
-            <a:extLst>
-              <a:ext uri="{FF2B5EF4-FFF2-40B4-BE49-F238E27FC236}">
-                <a16:creationId xmlns:a16="http://schemas.microsoft.com/office/drawing/2014/main" id="{1A0E01C5-6443-45AC-A81A-5C1FBD84A3DA}"/>
-              </a:ext>
-            </a:extLst>
-          </p:cNvPr>
-          <p:cNvPicPr>
-            <a:picLocks noChangeAspect="1"/>
-          </p:cNvPicPr>
-          <p:nvPr/>
-        </p:nvPicPr>
-        <p:blipFill>
-          <a:blip r:embed="rId10">
-            <a:extLst>
-              <a:ext uri="{28A0092B-C50C-407E-A947-70E740481C1C}">
-                <a14:useLocalDpi xmlns:a14="http://schemas.microsoft.com/office/drawing/2010/main" val="0"/>
-              </a:ext>
-              <a:ext uri="{96DAC541-7B7A-43D3-8B79-37D633B846F1}">
-                <asvg:svgBlip xmlns:asvg="http://schemas.microsoft.com/office/drawing/2016/SVG/main" r:embed="rId11"/>
-              </a:ext>
-            </a:extLst>
-          </a:blip>
-          <a:stretch>
-            <a:fillRect/>
-          </a:stretch>
-        </p:blipFill>
-        <p:spPr>
-          <a:xfrm>
-            <a:off x="903669" y="1666862"/>
-            <a:ext cx="213681" cy="213681"/>
-          </a:xfrm>
-          <a:prstGeom prst="rect">
-            <a:avLst/>
-          </a:prstGeom>
-        </p:spPr>
-      </p:pic>
-      <p:pic>
-        <p:nvPicPr>
-          <p:cNvPr id="28" name="Gráfico 27" descr="Distintivo 7">
-            <a:extLst>
-              <a:ext uri="{FF2B5EF4-FFF2-40B4-BE49-F238E27FC236}">
-                <a16:creationId xmlns:a16="http://schemas.microsoft.com/office/drawing/2014/main" id="{F11DDF94-37A0-48C2-998A-B7DFBB71B709}"/>
-              </a:ext>
-            </a:extLst>
-          </p:cNvPr>
-          <p:cNvPicPr>
-            <a:picLocks noChangeAspect="1"/>
-          </p:cNvPicPr>
-          <p:nvPr/>
-        </p:nvPicPr>
-        <p:blipFill>
-          <a:blip r:embed="rId12">
-            <a:extLst>
-              <a:ext uri="{28A0092B-C50C-407E-A947-70E740481C1C}">
-                <a14:useLocalDpi xmlns:a14="http://schemas.microsoft.com/office/drawing/2010/main" val="0"/>
-              </a:ext>
-              <a:ext uri="{96DAC541-7B7A-43D3-8B79-37D633B846F1}">
-                <asvg:svgBlip xmlns:asvg="http://schemas.microsoft.com/office/drawing/2016/SVG/main" r:embed="rId13"/>
-              </a:ext>
-            </a:extLst>
-          </a:blip>
-          <a:stretch>
-            <a:fillRect/>
-          </a:stretch>
-        </p:blipFill>
-        <p:spPr>
-          <a:xfrm>
-            <a:off x="903668" y="1880543"/>
-            <a:ext cx="213681" cy="213681"/>
-          </a:xfrm>
-          <a:prstGeom prst="rect">
-            <a:avLst/>
-          </a:prstGeom>
-        </p:spPr>
-      </p:pic>
     </p:spTree>
     <p:extLst>
       <p:ext uri="{BB962C8B-B14F-4D97-AF65-F5344CB8AC3E}">
@@ -6773,7 +7057,7 @@
               <a:rPr lang="pt-PT" sz="1300" dirty="0">
                 <a:ea typeface="Verdana" panose="020B0604030504040204" pitchFamily="34" charset="0"/>
               </a:rPr>
-              <a:t>, que permite o registo de utilizadores como streamers e </a:t>
+              <a:t> que permite o registo de utilizadores como streamers e </a:t>
             </a:r>
             <a:r>
               <a:rPr lang="pt-PT" sz="1300" i="1" dirty="0" err="1">
@@ -6938,7 +7222,7 @@
               <a:rPr lang="pt-PT" sz="1300" dirty="0">
                 <a:ea typeface="Verdana" panose="020B0604030504040204" pitchFamily="34" charset="0"/>
               </a:rPr>
-              <a:t>) ordenada pelo montante	 e, em caso de empate, pela avaliação dada;</a:t>
+              <a:t>) ordenada pelo montante e, em caso de empate, pela avaliação dada;</a:t>
             </a:r>
           </a:p>
           <a:p>
@@ -6951,7 +7235,7 @@
               <a:rPr lang="pt-PT" sz="1300" dirty="0">
                 <a:ea typeface="Verdana" panose="020B0604030504040204" pitchFamily="34" charset="0"/>
               </a:rPr>
-              <a:t>Possibilidade de listar os donativos de maior montante, num determinado intervalo numérico de avaliações especificado;</a:t>
+              <a:t>Possibilidade de listar os donativos de maior montante num determinado intervalo numérico de avaliações especificado;</a:t>
             </a:r>
           </a:p>
           <a:p>
@@ -7001,7 +7285,7 @@
               <a:rPr lang="pt-PT" sz="1300" dirty="0">
                 <a:ea typeface="Verdana" panose="020B0604030504040204" pitchFamily="34" charset="0"/>
               </a:rPr>
-              <a:t>O anterior mecanismo assenta na especificação dos pedidos de compra que são caracterizados pelo nome do </a:t>
+              <a:t>O anterior mecanismo assenta na especificação dos pedidos de compra, que são caracterizados pelo nome do </a:t>
             </a:r>
             <a:r>
               <a:rPr lang="pt-PT" sz="1300" dirty="0" err="1">
@@ -7805,7 +8089,7 @@
             </a:r>
             <a:r>
               <a:rPr lang="pt-PT" sz="1300" i="1" dirty="0"/>
-              <a:t> representativo das donações efetuadas através da plataforma</a:t>
+              <a:t> representativo dos donativos efetuadas através da plataforma</a:t>
             </a:r>
             <a:r>
               <a:rPr lang="pt-PT" sz="1300" dirty="0"/>
@@ -7954,7 +8238,7 @@
             </a:r>
             <a:r>
               <a:rPr lang="pt-PT" sz="1300" dirty="0"/>
-              <a:t>com os parâmetros de quantidade e de prioridade iguais; Esta restrição deve-se então  meramente ao facto de termos decidido cumprir a caracterização das </a:t>
+              <a:t>com os parâmetros de quantidade e de prioridade iguais. Esta restrição deve-se então  meramente ao facto de termos decidido cumprir a caracterização das </a:t>
             </a:r>
             <a:r>
               <a:rPr lang="pt-PT" sz="1300" dirty="0" err="1"/>
@@ -7962,7 +8246,7 @@
             </a:r>
             <a:r>
               <a:rPr lang="pt-PT" sz="1300" dirty="0"/>
-              <a:t> da forma que nos era pedida no enunciado.</a:t>
+              <a:t> da forma que nos era pedido no enunciado.</a:t>
             </a:r>
           </a:p>
         </p:txBody>
@@ -8467,45 +8751,95 @@
             </a:endParaRPr>
           </a:p>
           <a:p>
-            <a:pPr lvl="1" algn="just"/>
+            <a:r>
+              <a:rPr lang="pt-PT" sz="1600" dirty="0">
+                <a:solidFill>
+                  <a:schemeClr val="bg1"/>
+                </a:solidFill>
+              </a:rPr>
+              <a:t>Importar:</a:t>
+            </a:r>
+          </a:p>
+          <a:p>
+            <a:endParaRPr lang="pt-PT" sz="1600" dirty="0">
+              <a:solidFill>
+                <a:schemeClr val="bg1"/>
+              </a:solidFill>
+            </a:endParaRPr>
+          </a:p>
+          <a:p>
+            <a:endParaRPr lang="pt-PT" sz="1600" dirty="0">
+              <a:solidFill>
+                <a:schemeClr val="bg1"/>
+              </a:solidFill>
+            </a:endParaRPr>
+          </a:p>
+          <a:p>
             <a:r>
               <a:rPr lang="pt-PT" sz="1300" dirty="0">
                 <a:solidFill>
                   <a:schemeClr val="bg1"/>
                 </a:solidFill>
               </a:rPr>
-              <a:t>Para guardar os dados, é utilizada a função acima, que escreve num ficheiro (.txt) todos os objetos e atributos, usando uma certa formatação.</a:t>
-            </a:r>
-          </a:p>
-          <a:p>
-            <a:r>
-              <a:rPr lang="pt-PT" sz="1600" dirty="0">
+              <a:t>Para importar os dados, são utilizadas as mesmas funções. Uma delas um construtor da StreamZ, que abre um ficheiro (.</a:t>
+            </a:r>
+            <a:r>
+              <a:rPr lang="pt-PT" sz="1300" dirty="0" err="1">
                 <a:solidFill>
                   <a:schemeClr val="bg1"/>
                 </a:solidFill>
               </a:rPr>
-              <a:t>Importar:</a:t>
-            </a:r>
-          </a:p>
-          <a:p>
-            <a:pPr marL="0" indent="0">
-              <a:buNone/>
-            </a:pPr>
-            <a:endParaRPr lang="pt-PT" sz="2400" dirty="0">
-              <a:solidFill>
-                <a:schemeClr val="bg1"/>
-              </a:solidFill>
-            </a:endParaRPr>
-          </a:p>
-          <a:p>
-            <a:pPr lvl="1" algn="just"/>
+              <a:t>txt</a:t>
+            </a:r>
             <a:r>
               <a:rPr lang="pt-PT" sz="1300" dirty="0">
                 <a:solidFill>
                   <a:schemeClr val="bg1"/>
                 </a:solidFill>
               </a:rPr>
-              <a:t>Para importar os dados, é utilizado um dos construtores da StreamZ, que abre um ficheiro (.txt) e o lê, sabendo que se encontra pré formatado, e cria os objetos e atributos a partir do mesmo.</a:t>
+              <a:t>), importando-o na plataforma. A segunda é a função </a:t>
+            </a:r>
+            <a:r>
+              <a:rPr lang="pt-PT" sz="1300" i="1" dirty="0">
+                <a:solidFill>
+                  <a:schemeClr val="bg1"/>
+                </a:solidFill>
+              </a:rPr>
+              <a:t>save</a:t>
+            </a:r>
+            <a:r>
+              <a:rPr lang="pt-PT" sz="1300" dirty="0">
+                <a:solidFill>
+                  <a:schemeClr val="bg1"/>
+                </a:solidFill>
+              </a:rPr>
+              <a:t> que cria um ficheiro .</a:t>
+            </a:r>
+            <a:r>
+              <a:rPr lang="pt-PT" sz="1300" dirty="0" err="1">
+                <a:solidFill>
+                  <a:schemeClr val="bg1"/>
+                </a:solidFill>
+              </a:rPr>
+              <a:t>txt</a:t>
+            </a:r>
+            <a:r>
+              <a:rPr lang="pt-PT" sz="1300" dirty="0">
+                <a:solidFill>
+                  <a:schemeClr val="bg1"/>
+                </a:solidFill>
+              </a:rPr>
+              <a:t>, guardando toda a informação no mesmo;</a:t>
+            </a:r>
+          </a:p>
+          <a:p>
+            <a:r>
+              <a:rPr lang="pt-PT" sz="1300" dirty="0">
+                <a:solidFill>
+                  <a:schemeClr val="bg1"/>
+                </a:solidFill>
+              </a:rPr>
+              <a:t>Assim, as alterações efetuadas no âmbito da segunda parte do trabalho encontram-se sinalizadas no exemplo apresentado.</a:t>
             </a:r>
           </a:p>
           <a:p>
@@ -8737,7 +9071,7 @@
         </p:nvSpPr>
         <p:spPr bwMode="auto">
           <a:xfrm>
-            <a:off x="612650" y="4003949"/>
+            <a:off x="609602" y="3194500"/>
             <a:ext cx="3571240" cy="292388"/>
           </a:xfrm>
           <a:prstGeom prst="rect">
@@ -9147,10 +9481,10 @@
       </p:sp>
       <p:pic>
         <p:nvPicPr>
-          <p:cNvPr id="4" name="Imagem 3">
-            <a:extLst>
-              <a:ext uri="{FF2B5EF4-FFF2-40B4-BE49-F238E27FC236}">
-                <a16:creationId xmlns:a16="http://schemas.microsoft.com/office/drawing/2014/main" id="{10E1E845-A8EF-4309-9873-0747FCC83458}"/>
+          <p:cNvPr id="8" name="Imagem 7" descr="Uma imagem com texto&#10;&#10;Descrição gerada automaticamente">
+            <a:extLst>
+              <a:ext uri="{FF2B5EF4-FFF2-40B4-BE49-F238E27FC236}">
+                <a16:creationId xmlns:a16="http://schemas.microsoft.com/office/drawing/2014/main" id="{33260144-FEAC-4AD2-A7C1-CFFB3D8FC5B3}"/>
               </a:ext>
             </a:extLst>
           </p:cNvPr>
@@ -9173,14 +9507,626 @@
         </p:blipFill>
         <p:spPr>
           <a:xfrm>
-            <a:off x="5029237" y="2544300"/>
-            <a:ext cx="5724083" cy="3054779"/>
+            <a:off x="4969694" y="2469256"/>
+            <a:ext cx="6146890" cy="3293438"/>
           </a:xfrm>
           <a:prstGeom prst="rect">
             <a:avLst/>
           </a:prstGeom>
         </p:spPr>
       </p:pic>
+      <p:sp>
+        <p:nvSpPr>
+          <p:cNvPr id="11" name="Retângulo: Cantos Arredondados 10">
+            <a:extLst>
+              <a:ext uri="{FF2B5EF4-FFF2-40B4-BE49-F238E27FC236}">
+                <a16:creationId xmlns:a16="http://schemas.microsoft.com/office/drawing/2014/main" id="{198E515A-3D72-4C69-988A-76215D1B9135}"/>
+              </a:ext>
+            </a:extLst>
+          </p:cNvPr>
+          <p:cNvSpPr/>
+          <p:nvPr/>
+        </p:nvSpPr>
+        <p:spPr>
+          <a:xfrm>
+            <a:off x="4962326" y="2818586"/>
+            <a:ext cx="5941894" cy="244654"/>
+          </a:xfrm>
+          <a:prstGeom prst="roundRect">
+            <a:avLst/>
+          </a:prstGeom>
+          <a:noFill/>
+          <a:ln w="28575">
+            <a:solidFill>
+              <a:srgbClr val="FFC000"/>
+            </a:solidFill>
+          </a:ln>
+        </p:spPr>
+        <p:style>
+          <a:lnRef idx="2">
+            <a:schemeClr val="accent1">
+              <a:shade val="50000"/>
+            </a:schemeClr>
+          </a:lnRef>
+          <a:fillRef idx="1">
+            <a:schemeClr val="accent1"/>
+          </a:fillRef>
+          <a:effectRef idx="0">
+            <a:schemeClr val="accent1"/>
+          </a:effectRef>
+          <a:fontRef idx="minor">
+            <a:schemeClr val="lt1"/>
+          </a:fontRef>
+        </p:style>
+        <p:txBody>
+          <a:bodyPr rtlCol="0" anchor="ctr"/>
+          <a:lstStyle/>
+          <a:p>
+            <a:pPr algn="ctr"/>
+            <a:endParaRPr lang="pt-PT"/>
+          </a:p>
+        </p:txBody>
+      </p:sp>
+      <p:cxnSp>
+        <p:nvCxnSpPr>
+          <p:cNvPr id="15" name="Conexão: Curva 14">
+            <a:extLst>
+              <a:ext uri="{FF2B5EF4-FFF2-40B4-BE49-F238E27FC236}">
+                <a16:creationId xmlns:a16="http://schemas.microsoft.com/office/drawing/2014/main" id="{E0F54540-CB4F-48F7-86A8-CE25089909BA}"/>
+              </a:ext>
+            </a:extLst>
+          </p:cNvPr>
+          <p:cNvCxnSpPr>
+            <a:cxnSpLocks/>
+            <a:stCxn id="11" idx="0"/>
+            <a:endCxn id="17" idx="2"/>
+          </p:cNvCxnSpPr>
+          <p:nvPr/>
+        </p:nvCxnSpPr>
+        <p:spPr>
+          <a:xfrm rot="5400000" flipH="1" flipV="1">
+            <a:off x="7905551" y="2335096"/>
+            <a:ext cx="511212" cy="455769"/>
+          </a:xfrm>
+          <a:prstGeom prst="curvedConnector3">
+            <a:avLst>
+              <a:gd name="adj1" fmla="val 50000"/>
+            </a:avLst>
+          </a:prstGeom>
+          <a:ln w="19050">
+            <a:solidFill>
+              <a:srgbClr val="FFC000"/>
+            </a:solidFill>
+            <a:tailEnd type="triangle"/>
+          </a:ln>
+        </p:spPr>
+        <p:style>
+          <a:lnRef idx="1">
+            <a:schemeClr val="accent1"/>
+          </a:lnRef>
+          <a:fillRef idx="0">
+            <a:schemeClr val="accent1"/>
+          </a:fillRef>
+          <a:effectRef idx="0">
+            <a:schemeClr val="accent1"/>
+          </a:effectRef>
+          <a:fontRef idx="minor">
+            <a:schemeClr val="tx1"/>
+          </a:fontRef>
+        </p:style>
+      </p:cxnSp>
+      <p:sp>
+        <p:nvSpPr>
+          <p:cNvPr id="17" name="CaixaDeTexto 16">
+            <a:extLst>
+              <a:ext uri="{FF2B5EF4-FFF2-40B4-BE49-F238E27FC236}">
+                <a16:creationId xmlns:a16="http://schemas.microsoft.com/office/drawing/2014/main" id="{B12EFD78-50FA-497B-A01C-1C5CC357E9F2}"/>
+              </a:ext>
+            </a:extLst>
+          </p:cNvPr>
+          <p:cNvSpPr txBox="1"/>
+          <p:nvPr/>
+        </p:nvSpPr>
+        <p:spPr>
+          <a:xfrm>
+            <a:off x="7312117" y="1845709"/>
+            <a:ext cx="2153850" cy="461665"/>
+          </a:xfrm>
+          <a:prstGeom prst="rect">
+            <a:avLst/>
+          </a:prstGeom>
+          <a:noFill/>
+        </p:spPr>
+        <p:txBody>
+          <a:bodyPr wrap="square" rtlCol="0">
+            <a:spAutoFit/>
+          </a:bodyPr>
+          <a:lstStyle/>
+          <a:p>
+            <a:r>
+              <a:rPr lang="pt-PT" sz="1200" b="1" dirty="0">
+                <a:solidFill>
+                  <a:schemeClr val="bg1"/>
+                </a:solidFill>
+              </a:rPr>
+              <a:t>Donativos</a:t>
+            </a:r>
+            <a:r>
+              <a:rPr lang="pt-PT" sz="1200" dirty="0">
+                <a:solidFill>
+                  <a:schemeClr val="bg1"/>
+                </a:solidFill>
+              </a:rPr>
+              <a:t>: </a:t>
+            </a:r>
+            <a:r>
+              <a:rPr lang="pt-PT" sz="1200" i="1" dirty="0" err="1">
+                <a:solidFill>
+                  <a:schemeClr val="bg1"/>
+                </a:solidFill>
+              </a:rPr>
+              <a:t>streamer</a:t>
+            </a:r>
+            <a:r>
+              <a:rPr lang="pt-PT" sz="1200" dirty="0">
+                <a:solidFill>
+                  <a:schemeClr val="bg1"/>
+                </a:solidFill>
+              </a:rPr>
+              <a:t>, montante, avaliação</a:t>
+            </a:r>
+          </a:p>
+        </p:txBody>
+      </p:sp>
+      <p:sp>
+        <p:nvSpPr>
+          <p:cNvPr id="19" name="Retângulo: Cantos Arredondados 18">
+            <a:extLst>
+              <a:ext uri="{FF2B5EF4-FFF2-40B4-BE49-F238E27FC236}">
+                <a16:creationId xmlns:a16="http://schemas.microsoft.com/office/drawing/2014/main" id="{7A2F5AED-E385-4468-A984-1911E511C78A}"/>
+              </a:ext>
+            </a:extLst>
+          </p:cNvPr>
+          <p:cNvSpPr/>
+          <p:nvPr/>
+        </p:nvSpPr>
+        <p:spPr>
+          <a:xfrm>
+            <a:off x="4969694" y="3063240"/>
+            <a:ext cx="3554292" cy="103072"/>
+          </a:xfrm>
+          <a:prstGeom prst="roundRect">
+            <a:avLst/>
+          </a:prstGeom>
+          <a:noFill/>
+          <a:ln w="28575">
+            <a:solidFill>
+              <a:srgbClr val="00B0F0"/>
+            </a:solidFill>
+          </a:ln>
+        </p:spPr>
+        <p:style>
+          <a:lnRef idx="2">
+            <a:schemeClr val="accent1">
+              <a:shade val="50000"/>
+            </a:schemeClr>
+          </a:lnRef>
+          <a:fillRef idx="1">
+            <a:schemeClr val="accent1"/>
+          </a:fillRef>
+          <a:effectRef idx="0">
+            <a:schemeClr val="accent1"/>
+          </a:effectRef>
+          <a:fontRef idx="minor">
+            <a:schemeClr val="lt1"/>
+          </a:fontRef>
+        </p:style>
+        <p:txBody>
+          <a:bodyPr rtlCol="0" anchor="ctr"/>
+          <a:lstStyle/>
+          <a:p>
+            <a:pPr algn="ctr"/>
+            <a:endParaRPr lang="pt-PT"/>
+          </a:p>
+        </p:txBody>
+      </p:sp>
+      <p:cxnSp>
+        <p:nvCxnSpPr>
+          <p:cNvPr id="24" name="Conexão: Curva 23">
+            <a:extLst>
+              <a:ext uri="{FF2B5EF4-FFF2-40B4-BE49-F238E27FC236}">
+                <a16:creationId xmlns:a16="http://schemas.microsoft.com/office/drawing/2014/main" id="{20AC15FE-BB40-4F10-9624-43C0DF857132}"/>
+              </a:ext>
+            </a:extLst>
+          </p:cNvPr>
+          <p:cNvCxnSpPr>
+            <a:cxnSpLocks/>
+            <a:stCxn id="19" idx="3"/>
+            <a:endCxn id="28" idx="1"/>
+          </p:cNvCxnSpPr>
+          <p:nvPr/>
+        </p:nvCxnSpPr>
+        <p:spPr>
+          <a:xfrm flipV="1">
+            <a:off x="8523986" y="1854221"/>
+            <a:ext cx="461253" cy="1260555"/>
+          </a:xfrm>
+          <a:prstGeom prst="curvedConnector3">
+            <a:avLst>
+              <a:gd name="adj1" fmla="val 50000"/>
+            </a:avLst>
+          </a:prstGeom>
+          <a:ln w="19050">
+            <a:solidFill>
+              <a:srgbClr val="00B0F0"/>
+            </a:solidFill>
+            <a:tailEnd type="triangle"/>
+          </a:ln>
+        </p:spPr>
+        <p:style>
+          <a:lnRef idx="1">
+            <a:schemeClr val="accent1"/>
+          </a:lnRef>
+          <a:fillRef idx="0">
+            <a:schemeClr val="accent1"/>
+          </a:fillRef>
+          <a:effectRef idx="0">
+            <a:schemeClr val="accent1"/>
+          </a:effectRef>
+          <a:fontRef idx="minor">
+            <a:schemeClr val="tx1"/>
+          </a:fontRef>
+        </p:style>
+      </p:cxnSp>
+      <p:sp>
+        <p:nvSpPr>
+          <p:cNvPr id="28" name="CaixaDeTexto 27">
+            <a:extLst>
+              <a:ext uri="{FF2B5EF4-FFF2-40B4-BE49-F238E27FC236}">
+                <a16:creationId xmlns:a16="http://schemas.microsoft.com/office/drawing/2014/main" id="{305F18C3-F2C8-4F1C-901B-8198A19AC165}"/>
+              </a:ext>
+            </a:extLst>
+          </p:cNvPr>
+          <p:cNvSpPr txBox="1"/>
+          <p:nvPr/>
+        </p:nvSpPr>
+        <p:spPr>
+          <a:xfrm>
+            <a:off x="8985239" y="1715721"/>
+            <a:ext cx="2153850" cy="276999"/>
+          </a:xfrm>
+          <a:prstGeom prst="rect">
+            <a:avLst/>
+          </a:prstGeom>
+          <a:noFill/>
+        </p:spPr>
+        <p:txBody>
+          <a:bodyPr wrap="square" rtlCol="0">
+            <a:spAutoFit/>
+          </a:bodyPr>
+          <a:lstStyle/>
+          <a:p>
+            <a:r>
+              <a:rPr lang="pt-PT" sz="1200" b="1" dirty="0">
+                <a:solidFill>
+                  <a:schemeClr val="bg1"/>
+                </a:solidFill>
+              </a:rPr>
+              <a:t>Produtos</a:t>
+            </a:r>
+            <a:r>
+              <a:rPr lang="pt-PT" sz="1200" dirty="0">
+                <a:solidFill>
+                  <a:schemeClr val="bg1"/>
+                </a:solidFill>
+              </a:rPr>
+              <a:t>: preço, </a:t>
+            </a:r>
+            <a:r>
+              <a:rPr lang="pt-PT" sz="1200" i="1" dirty="0">
+                <a:solidFill>
+                  <a:schemeClr val="bg1"/>
+                </a:solidFill>
+              </a:rPr>
+              <a:t>stock</a:t>
+            </a:r>
+          </a:p>
+        </p:txBody>
+      </p:sp>
+      <p:sp>
+        <p:nvSpPr>
+          <p:cNvPr id="30" name="Retângulo: Cantos Arredondados 29">
+            <a:extLst>
+              <a:ext uri="{FF2B5EF4-FFF2-40B4-BE49-F238E27FC236}">
+                <a16:creationId xmlns:a16="http://schemas.microsoft.com/office/drawing/2014/main" id="{6A4FD5A4-993E-4D95-B2E1-C1D1FE8DA09F}"/>
+              </a:ext>
+            </a:extLst>
+          </p:cNvPr>
+          <p:cNvSpPr/>
+          <p:nvPr/>
+        </p:nvSpPr>
+        <p:spPr>
+          <a:xfrm>
+            <a:off x="4969694" y="3194500"/>
+            <a:ext cx="4684846" cy="108336"/>
+          </a:xfrm>
+          <a:prstGeom prst="roundRect">
+            <a:avLst/>
+          </a:prstGeom>
+          <a:noFill/>
+          <a:ln w="28575">
+            <a:solidFill>
+              <a:srgbClr val="00B050"/>
+            </a:solidFill>
+          </a:ln>
+        </p:spPr>
+        <p:style>
+          <a:lnRef idx="2">
+            <a:schemeClr val="accent1">
+              <a:shade val="50000"/>
+            </a:schemeClr>
+          </a:lnRef>
+          <a:fillRef idx="1">
+            <a:schemeClr val="accent1"/>
+          </a:fillRef>
+          <a:effectRef idx="0">
+            <a:schemeClr val="accent1"/>
+          </a:effectRef>
+          <a:fontRef idx="minor">
+            <a:schemeClr val="lt1"/>
+          </a:fontRef>
+        </p:style>
+        <p:txBody>
+          <a:bodyPr rtlCol="0" anchor="ctr"/>
+          <a:lstStyle/>
+          <a:p>
+            <a:pPr algn="ctr"/>
+            <a:endParaRPr lang="pt-PT"/>
+          </a:p>
+        </p:txBody>
+      </p:sp>
+      <p:cxnSp>
+        <p:nvCxnSpPr>
+          <p:cNvPr id="32" name="Conexão: Curva 31">
+            <a:extLst>
+              <a:ext uri="{FF2B5EF4-FFF2-40B4-BE49-F238E27FC236}">
+                <a16:creationId xmlns:a16="http://schemas.microsoft.com/office/drawing/2014/main" id="{1030FB84-DFFE-490C-A8F0-40519671954B}"/>
+              </a:ext>
+            </a:extLst>
+          </p:cNvPr>
+          <p:cNvCxnSpPr>
+            <a:cxnSpLocks/>
+            <a:stCxn id="30" idx="3"/>
+            <a:endCxn id="33" idx="0"/>
+          </p:cNvCxnSpPr>
+          <p:nvPr/>
+        </p:nvCxnSpPr>
+        <p:spPr>
+          <a:xfrm flipH="1">
+            <a:off x="7508456" y="3248668"/>
+            <a:ext cx="2146084" cy="2645286"/>
+          </a:xfrm>
+          <a:prstGeom prst="curvedConnector4">
+            <a:avLst>
+              <a:gd name="adj1" fmla="val -10652"/>
+              <a:gd name="adj2" fmla="val 51024"/>
+            </a:avLst>
+          </a:prstGeom>
+          <a:ln w="19050">
+            <a:solidFill>
+              <a:srgbClr val="00B050"/>
+            </a:solidFill>
+            <a:tailEnd type="triangle"/>
+          </a:ln>
+        </p:spPr>
+        <p:style>
+          <a:lnRef idx="1">
+            <a:schemeClr val="accent1"/>
+          </a:lnRef>
+          <a:fillRef idx="0">
+            <a:schemeClr val="accent1"/>
+          </a:fillRef>
+          <a:effectRef idx="0">
+            <a:schemeClr val="accent1"/>
+          </a:effectRef>
+          <a:fontRef idx="minor">
+            <a:schemeClr val="tx1"/>
+          </a:fontRef>
+        </p:style>
+      </p:cxnSp>
+      <p:sp>
+        <p:nvSpPr>
+          <p:cNvPr id="33" name="CaixaDeTexto 32">
+            <a:extLst>
+              <a:ext uri="{FF2B5EF4-FFF2-40B4-BE49-F238E27FC236}">
+                <a16:creationId xmlns:a16="http://schemas.microsoft.com/office/drawing/2014/main" id="{D801ADB7-3E1C-40D1-AC0B-1314766D9686}"/>
+              </a:ext>
+            </a:extLst>
+          </p:cNvPr>
+          <p:cNvSpPr txBox="1"/>
+          <p:nvPr/>
+        </p:nvSpPr>
+        <p:spPr>
+          <a:xfrm>
+            <a:off x="6431531" y="5893954"/>
+            <a:ext cx="2153850" cy="461665"/>
+          </a:xfrm>
+          <a:prstGeom prst="rect">
+            <a:avLst/>
+          </a:prstGeom>
+          <a:noFill/>
+        </p:spPr>
+        <p:txBody>
+          <a:bodyPr wrap="square" rtlCol="0">
+            <a:spAutoFit/>
+          </a:bodyPr>
+          <a:lstStyle/>
+          <a:p>
+            <a:r>
+              <a:rPr lang="pt-PT" sz="1200" b="1" i="1" dirty="0" err="1">
+                <a:solidFill>
+                  <a:schemeClr val="bg1"/>
+                </a:solidFill>
+              </a:rPr>
+              <a:t>Orders</a:t>
+            </a:r>
+            <a:r>
+              <a:rPr lang="pt-PT" sz="1200" dirty="0">
+                <a:solidFill>
+                  <a:schemeClr val="bg1"/>
+                </a:solidFill>
+              </a:rPr>
+              <a:t>: </a:t>
+            </a:r>
+            <a:r>
+              <a:rPr lang="pt-PT" sz="1200" i="1" dirty="0" err="1">
+                <a:solidFill>
+                  <a:schemeClr val="bg1"/>
+                </a:solidFill>
+              </a:rPr>
+              <a:t>viewer</a:t>
+            </a:r>
+            <a:r>
+              <a:rPr lang="pt-PT" sz="1200" dirty="0">
+                <a:solidFill>
+                  <a:schemeClr val="bg1"/>
+                </a:solidFill>
+              </a:rPr>
+              <a:t>, quantidade, prioridade, id do produto</a:t>
+            </a:r>
+          </a:p>
+        </p:txBody>
+      </p:sp>
+      <p:sp>
+        <p:nvSpPr>
+          <p:cNvPr id="3" name="Retângulo: Cantos Arredondados 2">
+            <a:extLst>
+              <a:ext uri="{FF2B5EF4-FFF2-40B4-BE49-F238E27FC236}">
+                <a16:creationId xmlns:a16="http://schemas.microsoft.com/office/drawing/2014/main" id="{6017A218-001A-4117-ADD5-5A9828FFACC9}"/>
+              </a:ext>
+            </a:extLst>
+          </p:cNvPr>
+          <p:cNvSpPr/>
+          <p:nvPr/>
+        </p:nvSpPr>
+        <p:spPr>
+          <a:xfrm>
+            <a:off x="4969694" y="2700164"/>
+            <a:ext cx="618306" cy="118422"/>
+          </a:xfrm>
+          <a:prstGeom prst="roundRect">
+            <a:avLst/>
+          </a:prstGeom>
+          <a:noFill/>
+          <a:ln w="19050"/>
+        </p:spPr>
+        <p:style>
+          <a:lnRef idx="2">
+            <a:schemeClr val="accent1">
+              <a:shade val="50000"/>
+            </a:schemeClr>
+          </a:lnRef>
+          <a:fillRef idx="1">
+            <a:schemeClr val="accent1"/>
+          </a:fillRef>
+          <a:effectRef idx="0">
+            <a:schemeClr val="accent1"/>
+          </a:effectRef>
+          <a:fontRef idx="minor">
+            <a:schemeClr val="lt1"/>
+          </a:fontRef>
+        </p:style>
+        <p:txBody>
+          <a:bodyPr rtlCol="0" anchor="ctr"/>
+          <a:lstStyle/>
+          <a:p>
+            <a:pPr algn="ctr"/>
+            <a:endParaRPr lang="pt-PT"/>
+          </a:p>
+        </p:txBody>
+      </p:sp>
+      <p:cxnSp>
+        <p:nvCxnSpPr>
+          <p:cNvPr id="10" name="Conexão: Curva 9">
+            <a:extLst>
+              <a:ext uri="{FF2B5EF4-FFF2-40B4-BE49-F238E27FC236}">
+                <a16:creationId xmlns:a16="http://schemas.microsoft.com/office/drawing/2014/main" id="{F2BD8727-2F54-498C-BD4B-7B0148074103}"/>
+              </a:ext>
+            </a:extLst>
+          </p:cNvPr>
+          <p:cNvCxnSpPr>
+            <a:cxnSpLocks/>
+            <a:stCxn id="3" idx="3"/>
+            <a:endCxn id="13" idx="2"/>
+          </p:cNvCxnSpPr>
+          <p:nvPr/>
+        </p:nvCxnSpPr>
+        <p:spPr>
+          <a:xfrm flipV="1">
+            <a:off x="5588000" y="2445854"/>
+            <a:ext cx="1370430" cy="313521"/>
+          </a:xfrm>
+          <a:prstGeom prst="curvedConnector2">
+            <a:avLst/>
+          </a:prstGeom>
+          <a:ln w="19050">
+            <a:tailEnd type="triangle"/>
+          </a:ln>
+        </p:spPr>
+        <p:style>
+          <a:lnRef idx="1">
+            <a:schemeClr val="accent1"/>
+          </a:lnRef>
+          <a:fillRef idx="0">
+            <a:schemeClr val="accent1"/>
+          </a:fillRef>
+          <a:effectRef idx="0">
+            <a:schemeClr val="accent1"/>
+          </a:effectRef>
+          <a:fontRef idx="minor">
+            <a:schemeClr val="tx1"/>
+          </a:fontRef>
+        </p:style>
+      </p:cxnSp>
+      <p:sp>
+        <p:nvSpPr>
+          <p:cNvPr id="13" name="CaixaDeTexto 12">
+            <a:extLst>
+              <a:ext uri="{FF2B5EF4-FFF2-40B4-BE49-F238E27FC236}">
+                <a16:creationId xmlns:a16="http://schemas.microsoft.com/office/drawing/2014/main" id="{6B2339C4-1172-422A-803B-966009DD616C}"/>
+              </a:ext>
+            </a:extLst>
+          </p:cNvPr>
+          <p:cNvSpPr txBox="1"/>
+          <p:nvPr/>
+        </p:nvSpPr>
+        <p:spPr>
+          <a:xfrm>
+            <a:off x="6340799" y="2199633"/>
+            <a:ext cx="1235262" cy="246221"/>
+          </a:xfrm>
+          <a:prstGeom prst="rect">
+            <a:avLst/>
+          </a:prstGeom>
+          <a:noFill/>
+        </p:spPr>
+        <p:txBody>
+          <a:bodyPr wrap="square" rtlCol="0">
+            <a:spAutoFit/>
+          </a:bodyPr>
+          <a:lstStyle/>
+          <a:p>
+            <a:r>
+              <a:rPr lang="pt-PT" sz="1000" b="1" dirty="0">
+                <a:solidFill>
+                  <a:schemeClr val="bg1"/>
+                </a:solidFill>
+              </a:rPr>
+              <a:t>StreamZ Capital</a:t>
+            </a:r>
+          </a:p>
+        </p:txBody>
+      </p:sp>
     </p:spTree>
     <p:extLst>
       <p:ext uri="{BB962C8B-B14F-4D97-AF65-F5344CB8AC3E}">
@@ -10843,7 +11789,7 @@
             <a:pPr algn="just"/>
             <a:r>
               <a:rPr lang="pt-PT" sz="1600" dirty="0"/>
-              <a:t>Não contém mais que a sua declaração, que retrata o erro tratado no seu nome.</a:t>
+              <a:t>Não contém mais que a sua declaração, que retrata o erro declarado no seu nome.</a:t>
             </a:r>
           </a:p>
         </p:txBody>
@@ -12567,13 +13513,13 @@
         </p:nvSpPr>
         <p:spPr>
           <a:xfrm>
-            <a:off x="558209" y="2221992"/>
-            <a:ext cx="11164399" cy="4418505"/>
+            <a:off x="498834" y="2011680"/>
+            <a:ext cx="11382257" cy="4779737"/>
           </a:xfrm>
         </p:spPr>
         <p:txBody>
           <a:bodyPr>
-            <a:normAutofit fontScale="55000" lnSpcReduction="20000"/>
+            <a:normAutofit fontScale="25000" lnSpcReduction="20000"/>
           </a:bodyPr>
           <a:lstStyle/>
           <a:p>
@@ -12583,7 +13529,7 @@
               </a:lnSpc>
             </a:pPr>
             <a:r>
-              <a:rPr lang="pt-PT" sz="2900" b="1" dirty="0"/>
+              <a:rPr lang="pt-PT" sz="4400" b="1" dirty="0"/>
               <a:t>Requeridas:</a:t>
             </a:r>
           </a:p>
@@ -12594,8 +13540,8 @@
               </a:lnSpc>
             </a:pPr>
             <a:r>
-              <a:rPr lang="pt-PT" dirty="0"/>
-              <a:t>Todas as funcionalidades requisitadas no problema da segunda parte, tal como a criação de .</a:t>
+              <a:rPr lang="pt-PT" sz="4000" dirty="0"/>
+              <a:t>Todas as funcionalidades requisitadas no problema da segunda parte, utilizando as estruturas de dados adequadas e também solicitadas, as árvores binárias de pesquisa, as filas de prioridade e as tabelas de dispersão.</a:t>
             </a:r>
           </a:p>
           <a:p>
@@ -12605,7 +13551,7 @@
               </a:lnSpc>
             </a:pPr>
             <a:r>
-              <a:rPr lang="pt-PT" sz="2900" b="1" dirty="0"/>
+              <a:rPr lang="pt-PT" sz="4400" b="1" dirty="0"/>
               <a:t>Adicionadas:</a:t>
             </a:r>
           </a:p>
@@ -12616,11 +13562,11 @@
               </a:lnSpc>
             </a:pPr>
             <a:r>
-              <a:rPr lang="pt-PT" i="1" u="sng" dirty="0"/>
+              <a:rPr lang="pt-PT" sz="4000" i="1" u="sng" dirty="0"/>
               <a:t>StreamZ</a:t>
             </a:r>
             <a:r>
-              <a:rPr lang="pt-PT" dirty="0"/>
+              <a:rPr lang="pt-PT" sz="4000" dirty="0"/>
               <a:t>:</a:t>
             </a:r>
           </a:p>
@@ -12631,24 +13577,62 @@
               </a:lnSpc>
             </a:pPr>
             <a:r>
-              <a:rPr lang="pt-PT" sz="2400" dirty="0"/>
+              <a:rPr lang="pt-PT" sz="4000" dirty="0"/>
               <a:t>Adicionamos um atributo </a:t>
             </a:r>
             <a:r>
-              <a:rPr lang="pt-PT" sz="2400" i="1" dirty="0" err="1"/>
-              <a:t>capacity</a:t>
-            </a:r>
-            <a:r>
-              <a:rPr lang="pt-PT" sz="2400" dirty="0"/>
-              <a:t>, que reflete a capacidade de </a:t>
-            </a:r>
-            <a:r>
-              <a:rPr lang="pt-PT" sz="2400" i="1" dirty="0" err="1"/>
-              <a:t>streams</a:t>
-            </a:r>
-            <a:r>
-              <a:rPr lang="pt-PT" sz="2400" dirty="0"/>
-              <a:t> ativas da plataforma.</a:t>
+              <a:rPr lang="pt-PT" sz="4000" i="1" dirty="0" err="1"/>
+              <a:t>streamz_capital</a:t>
+            </a:r>
+            <a:r>
+              <a:rPr lang="pt-PT" sz="4000" dirty="0"/>
+              <a:t>, que reflete o capital detido pela plataforma;</a:t>
+            </a:r>
+          </a:p>
+          <a:p>
+            <a:pPr lvl="2" algn="just">
+              <a:lnSpc>
+                <a:spcPct val="110000"/>
+              </a:lnSpc>
+            </a:pPr>
+            <a:r>
+              <a:rPr lang="pt-PT" sz="4000" dirty="0"/>
+              <a:t>Para além das estruturas de dados referidas em cima, adicionamos um vetor de produtos, onde de encontram todos os produtos disponíveis para venda;</a:t>
+            </a:r>
+          </a:p>
+          <a:p>
+            <a:pPr lvl="2" algn="just">
+              <a:lnSpc>
+                <a:spcPct val="110000"/>
+              </a:lnSpc>
+            </a:pPr>
+            <a:r>
+              <a:rPr lang="pt-PT" sz="4000" dirty="0"/>
+              <a:t>À medida que construímos cada uma das estruturas anteriores, também desenvolvemos as funções respetivas, que manipulavam cada uma das mesma, tais como </a:t>
+            </a:r>
+            <a:r>
+              <a:rPr lang="pt-PT" sz="4000" i="1" dirty="0" err="1"/>
+              <a:t>makeOrder</a:t>
+            </a:r>
+            <a:r>
+              <a:rPr lang="pt-PT" sz="4000" dirty="0"/>
+              <a:t>, </a:t>
+            </a:r>
+            <a:r>
+              <a:rPr lang="pt-PT" sz="4000" i="1" dirty="0" err="1"/>
+              <a:t>makeDonation</a:t>
+            </a:r>
+            <a:r>
+              <a:rPr lang="pt-PT" sz="4000" dirty="0"/>
+              <a:t>, </a:t>
+            </a:r>
+            <a:r>
+              <a:rPr lang="pt-PT" sz="4000" i="1" dirty="0" err="1"/>
+              <a:t>sellProduct</a:t>
+            </a:r>
+            <a:r>
+              <a:rPr lang="pt-PT" sz="4000" dirty="0"/>
+              <a:t>, etc.</a:t>
             </a:r>
           </a:p>
           <a:p>
@@ -12658,12 +13642,20 @@
               </a:lnSpc>
             </a:pPr>
             <a:r>
-              <a:rPr lang="pt-PT" dirty="0"/>
+              <a:rPr lang="pt-PT" sz="4000" dirty="0"/>
               <a:t> </a:t>
             </a:r>
             <a:r>
-              <a:rPr lang="pt-PT" u="sng" dirty="0"/>
-              <a:t>Classe dos Menus:</a:t>
+              <a:rPr lang="pt-PT" sz="4000" u="sng" dirty="0"/>
+              <a:t>Classe dos </a:t>
+            </a:r>
+            <a:r>
+              <a:rPr lang="pt-PT" sz="4000" i="1" u="sng" dirty="0" err="1"/>
+              <a:t>Products</a:t>
+            </a:r>
+            <a:r>
+              <a:rPr lang="pt-PT" sz="4000" u="sng" dirty="0"/>
+              <a:t>:</a:t>
             </a:r>
           </a:p>
           <a:p>
@@ -12673,16 +13665,132 @@
               </a:lnSpc>
             </a:pPr>
             <a:r>
-              <a:rPr lang="pt-PT" sz="2400" dirty="0"/>
-              <a:t>Utilizada na criação dos menus de consola interativos que se encontram na </a:t>
-            </a:r>
-            <a:r>
-              <a:rPr lang="pt-PT" sz="2400" i="1" dirty="0"/>
-              <a:t>framework</a:t>
-            </a:r>
-            <a:r>
-              <a:rPr lang="pt-PT" sz="2400" dirty="0"/>
-              <a:t>.</a:t>
+              <a:rPr lang="pt-PT" sz="4000" dirty="0"/>
+              <a:t>Utilizada na definição de cada produto que um </a:t>
+            </a:r>
+            <a:r>
+              <a:rPr lang="pt-PT" sz="4000" i="1" dirty="0" err="1"/>
+              <a:t>streamer</a:t>
+            </a:r>
+            <a:r>
+              <a:rPr lang="pt-PT" sz="4000" dirty="0"/>
+              <a:t> quer vender;</a:t>
+            </a:r>
+          </a:p>
+          <a:p>
+            <a:pPr lvl="2" algn="just">
+              <a:lnSpc>
+                <a:spcPct val="110000"/>
+              </a:lnSpc>
+            </a:pPr>
+            <a:r>
+              <a:rPr lang="pt-PT" sz="4000" dirty="0"/>
+              <a:t>Esta classe tem um atributo </a:t>
+            </a:r>
+            <a:r>
+              <a:rPr lang="pt-PT" sz="4000" i="1" dirty="0" err="1"/>
+              <a:t>price</a:t>
+            </a:r>
+            <a:r>
+              <a:rPr lang="pt-PT" sz="4000" dirty="0"/>
+              <a:t>, que em junção com as </a:t>
+            </a:r>
+            <a:r>
+              <a:rPr lang="pt-PT" sz="4000" i="1" dirty="0" err="1"/>
+              <a:t>wallets</a:t>
+            </a:r>
+            <a:r>
+              <a:rPr lang="pt-PT" sz="4000" dirty="0"/>
+              <a:t> adicionadas a cada utilizador, possibilitou a criação de um micro sistema de transações;</a:t>
+            </a:r>
+          </a:p>
+          <a:p>
+            <a:pPr lvl="2" algn="just">
+              <a:lnSpc>
+                <a:spcPct val="110000"/>
+              </a:lnSpc>
+            </a:pPr>
+            <a:r>
+              <a:rPr lang="pt-PT" sz="4000" dirty="0"/>
+              <a:t>No sistema de transações referido anteriormente, sempre que um </a:t>
+            </a:r>
+            <a:r>
+              <a:rPr lang="pt-PT" sz="4000" i="1" dirty="0" err="1"/>
+              <a:t>streamer</a:t>
+            </a:r>
+            <a:r>
+              <a:rPr lang="pt-PT" sz="4000" dirty="0"/>
+              <a:t> vende um produto, este está de facto a vendê-lo à </a:t>
+            </a:r>
+            <a:r>
+              <a:rPr lang="pt-PT" sz="4000" i="1" dirty="0" err="1"/>
+              <a:t>streamz</a:t>
+            </a:r>
+            <a:r>
+              <a:rPr lang="pt-PT" sz="4000" dirty="0"/>
+              <a:t>, que o compra 10% abaixo do seu preço real (</a:t>
+            </a:r>
+            <a:r>
+              <a:rPr lang="pt-PT" sz="4000" i="1" dirty="0"/>
+              <a:t>STREAMZ_RETAIL_COMISSION </a:t>
+            </a:r>
+            <a:r>
+              <a:rPr lang="pt-PT" sz="4000" dirty="0"/>
+              <a:t>= 0.1, nova macro definida no </a:t>
+            </a:r>
+            <a:r>
+              <a:rPr lang="pt-PT" sz="4000" i="1" dirty="0" err="1"/>
+              <a:t>utils.h</a:t>
+            </a:r>
+            <a:r>
+              <a:rPr lang="pt-PT" sz="4000" dirty="0"/>
+              <a:t>). De seguida, o produto fica disponível na plataforma e pode ser comprado por um </a:t>
+            </a:r>
+            <a:r>
+              <a:rPr lang="pt-PT" sz="4000" i="1" dirty="0" err="1"/>
+              <a:t>viewer</a:t>
+            </a:r>
+            <a:r>
+              <a:rPr lang="pt-PT" sz="4000" dirty="0"/>
+              <a:t>, quando este o compra já paga o preço real, tendo a plataforma, deste modo, um rendimento fixo.</a:t>
+            </a:r>
+          </a:p>
+          <a:p>
+            <a:pPr lvl="2" algn="just">
+              <a:lnSpc>
+                <a:spcPct val="110000"/>
+              </a:lnSpc>
+            </a:pPr>
+            <a:r>
+              <a:rPr lang="pt-PT" sz="4000" dirty="0"/>
+              <a:t>Por outro lado, a plataforma também permite aos </a:t>
+            </a:r>
+            <a:r>
+              <a:rPr lang="pt-PT" sz="4000" i="1" dirty="0" err="1"/>
+              <a:t>viewers</a:t>
+            </a:r>
+            <a:r>
+              <a:rPr lang="pt-PT" sz="4000" dirty="0"/>
+              <a:t> de cancelarem as suas ordens de compra a qualquer momento, contudo, o produto fica perdido, tendo de haver uma penalização no valor reembolsado, que é de </a:t>
+            </a:r>
+            <a:r>
+              <a:rPr lang="pt-PT" sz="4000" u="sng" dirty="0"/>
+              <a:t>80</a:t>
+            </a:r>
+            <a:r>
+              <a:rPr lang="pt-PT" sz="4000" dirty="0"/>
+              <a:t> % do preço pago, reduzindo as perdas da empresa par apenas 10%,  por cada ordem que é cancelada.</a:t>
+            </a:r>
+          </a:p>
+          <a:p>
+            <a:pPr lvl="2" algn="just">
+              <a:lnSpc>
+                <a:spcPct val="110000"/>
+              </a:lnSpc>
+            </a:pPr>
+            <a:r>
+              <a:rPr lang="pt-PT" sz="4000" dirty="0"/>
+              <a:t>Existe também um limite máximo de quantidade de produto por ordem de compra;</a:t>
             </a:r>
           </a:p>
           <a:p>
@@ -12692,19 +13800,19 @@
               </a:lnSpc>
             </a:pPr>
             <a:r>
-              <a:rPr lang="pt-PT" i="1" u="sng" dirty="0"/>
+              <a:rPr lang="pt-PT" sz="4000" i="1" u="sng" dirty="0"/>
               <a:t>StreamZ Framework</a:t>
             </a:r>
             <a:r>
-              <a:rPr lang="pt-PT" dirty="0"/>
+              <a:rPr lang="pt-PT" sz="4000" dirty="0"/>
               <a:t>, que utiliza a classe </a:t>
             </a:r>
             <a:r>
-              <a:rPr lang="pt-PT" i="1" dirty="0"/>
+              <a:rPr lang="pt-PT" sz="4000" i="1" dirty="0"/>
               <a:t>StreamZ</a:t>
             </a:r>
             <a:r>
-              <a:rPr lang="pt-PT" dirty="0"/>
+              <a:rPr lang="pt-PT" sz="4000" dirty="0"/>
               <a:t> e as restantes relacionadas com esta última, onde se encontram implementadas estas funcionalidades:</a:t>
             </a:r>
           </a:p>
@@ -12715,16 +13823,12 @@
               </a:lnSpc>
             </a:pPr>
             <a:r>
-              <a:rPr lang="pt-PT" sz="2400" dirty="0"/>
-              <a:t>Possibilidade de não criar uma, mas sim, um ilimitado número de plataformas </a:t>
-            </a:r>
-            <a:r>
-              <a:rPr lang="pt-PT" sz="2400" i="1" dirty="0"/>
-              <a:t>StreamZ</a:t>
-            </a:r>
-            <a:r>
-              <a:rPr lang="pt-PT" sz="2400" dirty="0"/>
-              <a:t>;</a:t>
+              <a:rPr lang="pt-PT" sz="4000" i="1" dirty="0" err="1"/>
+              <a:t>Viewers</a:t>
+            </a:r>
+            <a:r>
+              <a:rPr lang="pt-PT" sz="4000" dirty="0"/>
+              <a:t> têm então possibilidade de comprar produtos, fazer donativos e cancelar as suas compras;</a:t>
             </a:r>
           </a:p>
           <a:p>
@@ -12734,12 +13838,12 @@
               </a:lnSpc>
             </a:pPr>
             <a:r>
-              <a:rPr lang="pt-PT" sz="2400" dirty="0"/>
-              <a:t>Possibilidade de guardar ou importar a qualquer altura, no menu das definições, onde também é possível ativar o </a:t>
-            </a:r>
-            <a:r>
-              <a:rPr lang="pt-PT" sz="2400" i="1" dirty="0"/>
-              <a:t>auto save;</a:t>
+              <a:rPr lang="pt-PT" sz="4000" i="1" dirty="0" err="1"/>
+              <a:t>Streamers</a:t>
+            </a:r>
+            <a:r>
+              <a:rPr lang="pt-PT" sz="4000" dirty="0"/>
+              <a:t> podem agora vender os seus produtos </a:t>
             </a:r>
           </a:p>
           <a:p>
@@ -12749,16 +13853,47 @@
               </a:lnSpc>
             </a:pPr>
             <a:r>
-              <a:rPr lang="pt-PT" sz="2400" dirty="0"/>
-              <a:t>Sistema de </a:t>
-            </a:r>
-            <a:r>
-              <a:rPr lang="pt-PT" sz="2400" i="1" dirty="0"/>
-              <a:t>Login</a:t>
-            </a:r>
-            <a:r>
-              <a:rPr lang="pt-PT" sz="2400" dirty="0"/>
-              <a:t> (associado a cada uma das plataformas criadas);</a:t>
+              <a:rPr lang="pt-PT" sz="4000" dirty="0"/>
+              <a:t>Melhorias nos algoritmos criados anteriormente, com a utilização das novas estruturas de dados mais eficientes; (ex. </a:t>
+            </a:r>
+            <a:r>
+              <a:rPr lang="pt-PT" sz="4000" i="1" dirty="0" err="1"/>
+              <a:t>getStreamerByName</a:t>
+            </a:r>
+            <a:r>
+              <a:rPr lang="pt-PT" sz="4000" dirty="0"/>
+              <a:t>() com a utilização da </a:t>
+            </a:r>
+            <a:r>
+              <a:rPr lang="pt-PT" sz="4000" i="1" dirty="0" err="1"/>
+              <a:t>hash</a:t>
+            </a:r>
+            <a:r>
+              <a:rPr lang="pt-PT" sz="4000" dirty="0"/>
+              <a:t> </a:t>
+            </a:r>
+            <a:r>
+              <a:rPr lang="pt-PT" sz="4000" i="1" dirty="0" err="1"/>
+              <a:t>table</a:t>
+            </a:r>
+            <a:r>
+              <a:rPr lang="pt-PT" sz="4000" dirty="0"/>
+              <a:t>);</a:t>
+            </a:r>
+          </a:p>
+          <a:p>
+            <a:pPr lvl="1" algn="just">
+              <a:lnSpc>
+                <a:spcPct val="110000"/>
+              </a:lnSpc>
+            </a:pPr>
+            <a:r>
+              <a:rPr lang="pt-PT" sz="4000" u="sng" dirty="0"/>
+              <a:t>Informação guardada em ficheiros</a:t>
+            </a:r>
+            <a:r>
+              <a:rPr lang="pt-PT" sz="4000" dirty="0"/>
+              <a:t>:</a:t>
             </a:r>
           </a:p>
           <a:p>
@@ -12768,16 +13903,8 @@
               </a:lnSpc>
             </a:pPr>
             <a:r>
-              <a:rPr lang="pt-PT" sz="2400" dirty="0"/>
-              <a:t>Passwords dos utilizadores encriptadas, através do algoritmo </a:t>
-            </a:r>
-            <a:r>
-              <a:rPr lang="pt-PT" sz="2400" i="1" dirty="0"/>
-              <a:t>sha256</a:t>
-            </a:r>
-            <a:r>
-              <a:rPr lang="pt-PT" sz="2400" dirty="0"/>
-              <a:t> (considerado totalmente seguro na atualidade);</a:t>
+              <a:rPr lang="pt-PT" sz="4000" dirty="0"/>
+              <a:t>A informação relativa às carteiras de cada utilizador é agora guardada em ficheiros;</a:t>
             </a:r>
           </a:p>
           <a:p>
@@ -12787,57 +13914,8 @@
               </a:lnSpc>
             </a:pPr>
             <a:r>
-              <a:rPr lang="pt-PT" sz="2400" i="1" dirty="0" err="1"/>
-              <a:t>Admin</a:t>
-            </a:r>
-            <a:r>
-              <a:rPr lang="pt-PT" sz="2400" dirty="0"/>
-              <a:t> com a possibilidade de criar e entrar nas contas de todos os utilizadores.</a:t>
-            </a:r>
-          </a:p>
-          <a:p>
-            <a:pPr lvl="1" algn="just">
-              <a:lnSpc>
-                <a:spcPct val="110000"/>
-              </a:lnSpc>
-            </a:pPr>
-            <a:r>
-              <a:rPr lang="pt-PT" u="sng" dirty="0"/>
-              <a:t>Informação guardada em ficheiros</a:t>
-            </a:r>
-            <a:r>
-              <a:rPr lang="pt-PT" dirty="0"/>
-              <a:t>:</a:t>
-            </a:r>
-          </a:p>
-          <a:p>
-            <a:pPr lvl="2" algn="just">
-              <a:lnSpc>
-                <a:spcPct val="110000"/>
-              </a:lnSpc>
-            </a:pPr>
-            <a:r>
-              <a:rPr lang="pt-PT" sz="2400" dirty="0"/>
-              <a:t>Cada ficheiro tem um indicativo de que se trata de um ficheiro formatado pela </a:t>
-            </a:r>
-            <a:r>
-              <a:rPr lang="pt-PT" sz="2400" i="1" dirty="0"/>
-              <a:t>StreamZ</a:t>
-            </a:r>
-            <a:r>
-              <a:rPr lang="pt-PT" sz="2400" dirty="0"/>
-              <a:t>, caso contrário é ignorado;</a:t>
-            </a:r>
-          </a:p>
-          <a:p>
-            <a:pPr lvl="2" algn="just">
-              <a:lnSpc>
-                <a:spcPct val="110000"/>
-              </a:lnSpc>
-            </a:pPr>
-            <a:r>
-              <a:rPr lang="pt-PT" sz="2400" dirty="0"/>
-              <a:t>Todo os comentários são também guardados nos respetivos ficheiros;</a:t>
+              <a:rPr lang="pt-PT" sz="4000" dirty="0"/>
+              <a:t>Os produtos são também guardados, tal como os donativos e ordens de compra;</a:t>
             </a:r>
           </a:p>
           <a:p>
@@ -12896,8 +13974,8 @@
         </p:blipFill>
         <p:spPr>
           <a:xfrm>
-            <a:off x="9616498" y="4883912"/>
-            <a:ext cx="364081" cy="364081"/>
+            <a:off x="9502324" y="4015901"/>
+            <a:ext cx="245209" cy="245209"/>
           </a:xfrm>
           <a:custGeom>
             <a:avLst/>
@@ -14671,14 +15749,14 @@
             <a:pPr lvl="1"/>
             <a:r>
               <a:rPr lang="pt-PT" sz="1300" dirty="0"/>
-              <a:t>Organizar o trabalho para o tempo que tínhamos, uma vez que não tínhamos imensa disponibilidade;</a:t>
+              <a:t>Organizar o trabalho mediante o tempo que tínhamos, uma vez que não tínhamos imensa disponibilidade;</a:t>
             </a:r>
           </a:p>
           <a:p>
             <a:pPr lvl="1"/>
             <a:r>
               <a:rPr lang="pt-PT" sz="1300" dirty="0"/>
-              <a:t>Não, de certa forma, destruir todo o trabalho que já tínhamos feito antes, com as modificações que tivemos de fazer.</a:t>
+              <a:t>De certa forma, não destruir todo o trabalho que já tínhamos feito antes com as modificações que tivemos de fazer.</a:t>
             </a:r>
           </a:p>
           <a:p>

</xml_diff>